<commit_message>
Added names to poster
</commit_message>
<xml_diff>
--- a/poster.pptx
+++ b/poster.pptx
@@ -154,6 +154,10 @@
     </p:ext>
   </p:extLst>
 </p:presentation>
+</file>
+
+<file path=ppt/revisionInfo.xml><?xml version="1.0" encoding="utf-8"?>
+<p1510:revInfo xmlns:a="http://schemas.openxmlformats.org/drawingml/2006/main" xmlns:r="http://schemas.openxmlformats.org/officeDocument/2006/relationships" xmlns:p1510="http://schemas.microsoft.com/office/powerpoint/2015/10/main"/>
 </file>
 
 <file path=ppt/notesMasters/notesMaster1.xml><?xml version="1.0" encoding="utf-8"?>
@@ -4769,22 +4773,13 @@
               <a:defRPr/>
             </a:pPr>
             <a:r>
-              <a:rPr kumimoji="0" lang="en-US" altLang="zh-TW" sz="6000" dirty="0">
+              <a:rPr kumimoji="0" lang="en-US" altLang="zh-TW" sz="6000" dirty="0" err="1">
                 <a:solidFill>
                   <a:srgbClr val="FFFFFF"/>
                 </a:solidFill>
                 <a:latin typeface="Helvetica" pitchFamily="34" charset="0"/>
               </a:rPr>
-              <a:t>Anthony Degleris, </a:t>
-            </a:r>
-            <a:r>
-              <a:rPr kumimoji="0" lang="en-US" altLang="zh-TW" sz="6000" dirty="0" err="1">
-                <a:solidFill>
-                  <a:srgbClr val="FFFFFF"/>
-                </a:solidFill>
-                <a:latin typeface="Helvetica" pitchFamily="34" charset="0"/>
-              </a:rPr>
-              <a:t>Soheil</a:t>
+              <a:t>Abhi</a:t>
             </a:r>
             <a:r>
               <a:rPr kumimoji="0" lang="en-US" altLang="zh-TW" sz="6000" dirty="0">
@@ -4802,7 +4797,7 @@
                 </a:solidFill>
                 <a:latin typeface="Helvetica" pitchFamily="34" charset="0"/>
               </a:rPr>
-              <a:t>Feizi</a:t>
+              <a:t>Kulgod</a:t>
             </a:r>
             <a:r>
               <a:rPr kumimoji="0" lang="en-US" altLang="zh-TW" sz="6000" dirty="0">
@@ -4811,26 +4806,23 @@
                 </a:solidFill>
                 <a:latin typeface="Helvetica" pitchFamily="34" charset="0"/>
               </a:rPr>
-              <a:t>, and David </a:t>
-            </a:r>
-            <a:r>
-              <a:rPr kumimoji="0" lang="en-US" altLang="zh-TW" sz="6000" dirty="0" err="1">
+              <a:t>, Anthony Degleris, Isaac </a:t>
+            </a:r>
+            <a:r>
+              <a:rPr kumimoji="0" lang="en-US" altLang="zh-TW" sz="6000">
                 <a:solidFill>
                   <a:srgbClr val="FFFFFF"/>
                 </a:solidFill>
                 <a:latin typeface="Helvetica" pitchFamily="34" charset="0"/>
               </a:rPr>
-              <a:t>Tse</a:t>
-            </a:r>
-            <a:r>
-              <a:rPr kumimoji="0" lang="en-US" altLang="zh-TW" sz="6000" dirty="0">
-                <a:solidFill>
-                  <a:srgbClr val="FFFFFF"/>
-                </a:solidFill>
-                <a:latin typeface="Helvetica" pitchFamily="34" charset="0"/>
-              </a:rPr>
-              <a:t> </a:t>
-            </a:r>
+              <a:t>Sheinfeld </a:t>
+            </a:r>
+            <a:endParaRPr kumimoji="0" lang="en-US" altLang="zh-TW" sz="6000" dirty="0">
+              <a:solidFill>
+                <a:srgbClr val="FFFFFF"/>
+              </a:solidFill>
+              <a:latin typeface="Helvetica" pitchFamily="34" charset="0"/>
+            </a:endParaRPr>
           </a:p>
         </p:txBody>
       </p:sp>

</xml_diff>

<commit_message>
Added results table to poster
</commit_message>
<xml_diff>
--- a/poster.pptx
+++ b/poster.pptx
@@ -154,6 +154,10 @@
     </p:ext>
   </p:extLst>
 </p:presentation>
+</file>
+
+<file path=ppt/revisionInfo.xml><?xml version="1.0" encoding="utf-8"?>
+<p1510:revInfo xmlns:a="http://schemas.openxmlformats.org/drawingml/2006/main" xmlns:r="http://schemas.openxmlformats.org/officeDocument/2006/relationships" xmlns:p1510="http://schemas.microsoft.com/office/powerpoint/2015/10/main"/>
 </file>
 
 <file path=ppt/notesMasters/notesMaster1.xml><?xml version="1.0" encoding="utf-8"?>
@@ -4752,7 +4756,7 @@
         <p:spPr>
           <a:xfrm>
             <a:off x="23111122" y="3615870"/>
-            <a:ext cx="9444849" cy="15692895"/>
+            <a:ext cx="9444849" cy="8728530"/>
           </a:xfrm>
           <a:prstGeom prst="roundRect">
             <a:avLst>
@@ -6184,8 +6188,8 @@
         </p:blipFill>
         <p:spPr>
           <a:xfrm>
-            <a:off x="9048762" y="6828902"/>
-            <a:ext cx="13210503" cy="987057"/>
+            <a:off x="9592240" y="6798194"/>
+            <a:ext cx="12105584" cy="904500"/>
           </a:xfrm>
           <a:prstGeom prst="rect">
             <a:avLst/>
@@ -6201,7 +6205,7 @@
         <p:spPr>
           <a:xfrm>
             <a:off x="23545799" y="20726400"/>
-            <a:ext cx="8578829" cy="830997"/>
+            <a:ext cx="8578829" cy="1015663"/>
           </a:xfrm>
           <a:prstGeom prst="rect">
             <a:avLst/>
@@ -6219,61 +6223,31 @@
               <a:buAutoNum type="arabicPeriod"/>
             </a:pPr>
             <a:r>
-              <a:rPr lang="en-US" sz="2400" dirty="0">
-                <a:latin typeface="Helvetica" charset="0"/>
-                <a:ea typeface="Helvetica" charset="0"/>
-                <a:cs typeface="Helvetica" charset="0"/>
+              <a:rPr lang="en-US" sz="2000" dirty="0">
+                <a:latin typeface="Helvetica" panose="020B0604020202020204" pitchFamily="34" charset="0"/>
+                <a:cs typeface="Helvetica" panose="020B0604020202020204" pitchFamily="34" charset="0"/>
               </a:rPr>
-              <a:t>This method was developed jointly with Guillermo </a:t>
-            </a:r>
-            <a:r>
-              <a:rPr lang="en-US" sz="2400" dirty="0" err="1">
-                <a:latin typeface="Helvetica" charset="0"/>
-                <a:ea typeface="Helvetica" charset="0"/>
-                <a:cs typeface="Helvetica" charset="0"/>
+              <a:t>[1]G. </a:t>
+            </a:r>
+            <a:r>
+              <a:rPr lang="en-US" sz="2000" dirty="0" err="1">
+                <a:latin typeface="Helvetica" panose="020B0604020202020204" pitchFamily="34" charset="0"/>
+                <a:cs typeface="Helvetica" panose="020B0604020202020204" pitchFamily="34" charset="0"/>
               </a:rPr>
               <a:t>Angeris</a:t>
             </a:r>
             <a:r>
-              <a:rPr lang="en-US" sz="2400" dirty="0">
-                <a:latin typeface="Helvetica" charset="0"/>
-                <a:ea typeface="Helvetica" charset="0"/>
-                <a:cs typeface="Helvetica" charset="0"/>
+              <a:rPr lang="en-US" sz="2000" dirty="0">
+                <a:latin typeface="Helvetica" panose="020B0604020202020204" pitchFamily="34" charset="0"/>
+                <a:cs typeface="Helvetica" panose="020B0604020202020204" pitchFamily="34" charset="0"/>
               </a:rPr>
-              <a:t> of </a:t>
-            </a:r>
-            <a:r>
-              <a:rPr lang="en-US" sz="2400" dirty="0" err="1">
-                <a:latin typeface="Helvetica" charset="0"/>
-                <a:ea typeface="Helvetica" charset="0"/>
-                <a:cs typeface="Helvetica" charset="0"/>
-              </a:rPr>
-              <a:t>StanfordAIR</a:t>
-            </a:r>
-            <a:r>
-              <a:rPr lang="en-US" sz="2400" dirty="0">
-                <a:latin typeface="Helvetica" charset="0"/>
-                <a:ea typeface="Helvetica" charset="0"/>
-                <a:cs typeface="Helvetica" charset="0"/>
-              </a:rPr>
-              <a:t>. His work can be found at https://</a:t>
-            </a:r>
-            <a:r>
-              <a:rPr lang="en-US" sz="2400" dirty="0" err="1">
-                <a:latin typeface="Helvetica" charset="0"/>
-                <a:ea typeface="Helvetica" charset="0"/>
-                <a:cs typeface="Helvetica" charset="0"/>
-              </a:rPr>
-              <a:t>guille.site</a:t>
-            </a:r>
-            <a:r>
-              <a:rPr lang="en-US" sz="2400" dirty="0">
-                <a:latin typeface="Helvetica" charset="0"/>
-                <a:ea typeface="Helvetica" charset="0"/>
-                <a:cs typeface="Helvetica" charset="0"/>
-              </a:rPr>
-              <a:t>.</a:t>
-            </a:r>
+              <a:t>, "Some thoughts on global path optimization", 2017. [Online]. Available: https://guille.site/path-optimization-thoughts.html. [Accessed: 11- Dec- 2017].</a:t>
+            </a:r>
+            <a:endParaRPr lang="en-US" sz="2000" dirty="0">
+              <a:latin typeface="Helvetica" panose="020B0604020202020204" pitchFamily="34" charset="0"/>
+              <a:ea typeface="Helvetica" charset="0"/>
+              <a:cs typeface="Helvetica" panose="020B0604020202020204" pitchFamily="34" charset="0"/>
+            </a:endParaRPr>
           </a:p>
         </p:txBody>
       </p:sp>
@@ -6877,6 +6851,558 @@
           </p:spPr>
         </p:pic>
       </p:grpSp>
+      <p:sp>
+        <p:nvSpPr>
+          <p:cNvPr id="43" name="TextBox 42">
+            <a:extLst>
+              <a:ext uri="{FF2B5EF4-FFF2-40B4-BE49-F238E27FC236}">
+                <a16:creationId xmlns:a16="http://schemas.microsoft.com/office/drawing/2014/main" id="{7F9C78A8-1537-4127-9AD4-195CB7F53866}"/>
+              </a:ext>
+            </a:extLst>
+          </p:cNvPr>
+          <p:cNvSpPr txBox="1"/>
+          <p:nvPr/>
+        </p:nvSpPr>
+        <p:spPr>
+          <a:xfrm>
+            <a:off x="23341639" y="13709531"/>
+            <a:ext cx="9028975" cy="954107"/>
+          </a:xfrm>
+          <a:prstGeom prst="rect">
+            <a:avLst/>
+          </a:prstGeom>
+          <a:noFill/>
+        </p:spPr>
+        <p:txBody>
+          <a:bodyPr wrap="square" rtlCol="0">
+            <a:spAutoFit/>
+          </a:bodyPr>
+          <a:lstStyle/>
+          <a:p>
+            <a:pPr algn="just"/>
+            <a:r>
+              <a:rPr lang="en-US" sz="2800" dirty="0">
+                <a:latin typeface="Helvetica" charset="0"/>
+                <a:ea typeface="Helvetica" charset="0"/>
+                <a:cs typeface="Helvetica" charset="0"/>
+              </a:rPr>
+              <a:t>. </a:t>
+            </a:r>
+          </a:p>
+          <a:p>
+            <a:pPr marL="342900" indent="-342900" algn="just">
+              <a:buFont typeface="Arial" panose="020B0604020202020204" pitchFamily="34" charset="0"/>
+              <a:buChar char="•"/>
+            </a:pPr>
+            <a:r>
+              <a:rPr lang="en-US" sz="2800" dirty="0">
+                <a:latin typeface="Helvetica" charset="0"/>
+                <a:ea typeface="Helvetica" charset="0"/>
+                <a:cs typeface="Helvetica" charset="0"/>
+              </a:rPr>
+              <a:t>Lorem </a:t>
+            </a:r>
+            <a:r>
+              <a:rPr lang="en-US" sz="2800" dirty="0" err="1">
+                <a:latin typeface="Helvetica" charset="0"/>
+                <a:ea typeface="Helvetica" charset="0"/>
+                <a:cs typeface="Helvetica" charset="0"/>
+              </a:rPr>
+              <a:t>impsum</a:t>
+            </a:r>
+            <a:r>
+              <a:rPr lang="en-US" sz="2800" dirty="0">
+                <a:latin typeface="Helvetica" charset="0"/>
+                <a:ea typeface="Helvetica" charset="0"/>
+                <a:cs typeface="Helvetica" charset="0"/>
+              </a:rPr>
+              <a:t> </a:t>
+            </a:r>
+            <a:r>
+              <a:rPr lang="en-US" sz="2800" dirty="0" err="1">
+                <a:latin typeface="Helvetica" charset="0"/>
+                <a:ea typeface="Helvetica" charset="0"/>
+                <a:cs typeface="Helvetica" charset="0"/>
+              </a:rPr>
+              <a:t>dorum</a:t>
+            </a:r>
+            <a:endParaRPr lang="en-US" sz="2800" dirty="0">
+              <a:latin typeface="Helvetica" charset="0"/>
+              <a:ea typeface="Helvetica" charset="0"/>
+              <a:cs typeface="Helvetica" charset="0"/>
+            </a:endParaRPr>
+          </a:p>
+        </p:txBody>
+      </p:sp>
+      <p:graphicFrame>
+        <p:nvGraphicFramePr>
+          <p:cNvPr id="5" name="Table 4">
+            <a:extLst>
+              <a:ext uri="{FF2B5EF4-FFF2-40B4-BE49-F238E27FC236}">
+                <a16:creationId xmlns:a16="http://schemas.microsoft.com/office/drawing/2014/main" id="{9FBBDEDD-B58C-4292-8E0C-3EB95D791C4F}"/>
+              </a:ext>
+            </a:extLst>
+          </p:cNvPr>
+          <p:cNvGraphicFramePr>
+            <a:graphicFrameLocks noGrp="1"/>
+          </p:cNvGraphicFramePr>
+          <p:nvPr>
+            <p:extLst>
+              <p:ext uri="{D42A27DB-BD31-4B8C-83A1-F6EECF244321}">
+                <p14:modId xmlns:p14="http://schemas.microsoft.com/office/powerpoint/2010/main" val="2917819577"/>
+              </p:ext>
+            </p:extLst>
+          </p:nvPr>
+        </p:nvGraphicFramePr>
+        <p:xfrm>
+          <a:off x="23610729" y="4907165"/>
+          <a:ext cx="8445633" cy="2415920"/>
+        </p:xfrm>
+        <a:graphic>
+          <a:graphicData uri="http://schemas.openxmlformats.org/drawingml/2006/table">
+            <a:tbl>
+              <a:tblPr firstRow="1" bandRow="1">
+                <a:tableStyleId>{21E4AEA4-8DFA-4A89-87EB-49C32662AFE0}</a:tableStyleId>
+              </a:tblPr>
+              <a:tblGrid>
+                <a:gridCol w="2815211">
+                  <a:extLst>
+                    <a:ext uri="{9D8B030D-6E8A-4147-A177-3AD203B41FA5}">
+                      <a16:colId xmlns:a16="http://schemas.microsoft.com/office/drawing/2014/main" val="7502155"/>
+                    </a:ext>
+                  </a:extLst>
+                </a:gridCol>
+                <a:gridCol w="2815211">
+                  <a:extLst>
+                    <a:ext uri="{9D8B030D-6E8A-4147-A177-3AD203B41FA5}">
+                      <a16:colId xmlns:a16="http://schemas.microsoft.com/office/drawing/2014/main" val="3360269338"/>
+                    </a:ext>
+                  </a:extLst>
+                </a:gridCol>
+                <a:gridCol w="2815211">
+                  <a:extLst>
+                    <a:ext uri="{9D8B030D-6E8A-4147-A177-3AD203B41FA5}">
+                      <a16:colId xmlns:a16="http://schemas.microsoft.com/office/drawing/2014/main" val="3462760015"/>
+                    </a:ext>
+                  </a:extLst>
+                </a:gridCol>
+              </a:tblGrid>
+              <a:tr h="822960">
+                <a:tc>
+                  <a:txBody>
+                    <a:bodyPr/>
+                    <a:lstStyle/>
+                    <a:p>
+                      <a:r>
+                        <a:rPr lang="en-US" sz="2600" dirty="0"/>
+                        <a:t>Algorithm</a:t>
+                      </a:r>
+                    </a:p>
+                  </a:txBody>
+                  <a:tcPr marL="85820" marR="85820" marT="42910" marB="42910"/>
+                </a:tc>
+                <a:tc>
+                  <a:txBody>
+                    <a:bodyPr/>
+                    <a:lstStyle/>
+                    <a:p>
+                      <a:r>
+                        <a:rPr lang="en-US" sz="2600" dirty="0"/>
+                        <a:t>Success Rate</a:t>
+                      </a:r>
+                    </a:p>
+                  </a:txBody>
+                  <a:tcPr marL="85820" marR="85820" marT="42910" marB="42910"/>
+                </a:tc>
+                <a:tc>
+                  <a:txBody>
+                    <a:bodyPr/>
+                    <a:lstStyle/>
+                    <a:p>
+                      <a:r>
+                        <a:rPr lang="en-US" sz="2600" dirty="0"/>
+                        <a:t>Average Path Length</a:t>
+                      </a:r>
+                    </a:p>
+                  </a:txBody>
+                  <a:tcPr marL="85820" marR="85820" marT="42910" marB="42910"/>
+                </a:tc>
+                <a:extLst>
+                  <a:ext uri="{0D108BD9-81ED-4DB2-BD59-A6C34878D82A}">
+                    <a16:rowId xmlns:a16="http://schemas.microsoft.com/office/drawing/2014/main" val="3802877361"/>
+                  </a:ext>
+                </a:extLst>
+              </a:tr>
+              <a:tr h="0">
+                <a:tc>
+                  <a:txBody>
+                    <a:bodyPr/>
+                    <a:lstStyle/>
+                    <a:p>
+                      <a:r>
+                        <a:rPr lang="en-US" sz="2800" dirty="0"/>
+                        <a:t>Optimization</a:t>
+                      </a:r>
+                    </a:p>
+                  </a:txBody>
+                  <a:tcPr marL="85820" marR="85820" marT="42910" marB="42910"/>
+                </a:tc>
+                <a:tc>
+                  <a:txBody>
+                    <a:bodyPr/>
+                    <a:lstStyle/>
+                    <a:p>
+                      <a:r>
+                        <a:rPr lang="en-US" sz="2800" dirty="0"/>
+                        <a:t>1.0</a:t>
+                      </a:r>
+                    </a:p>
+                  </a:txBody>
+                  <a:tcPr marL="85820" marR="85820" marT="42910" marB="42910"/>
+                </a:tc>
+                <a:tc>
+                  <a:txBody>
+                    <a:bodyPr/>
+                    <a:lstStyle/>
+                    <a:p>
+                      <a:r>
+                        <a:rPr lang="en-US" sz="2800" dirty="0"/>
+                        <a:t>156.3</a:t>
+                      </a:r>
+                    </a:p>
+                  </a:txBody>
+                  <a:tcPr marL="85820" marR="85820" marT="42910" marB="42910"/>
+                </a:tc>
+                <a:extLst>
+                  <a:ext uri="{0D108BD9-81ED-4DB2-BD59-A6C34878D82A}">
+                    <a16:rowId xmlns:a16="http://schemas.microsoft.com/office/drawing/2014/main" val="412087516"/>
+                  </a:ext>
+                </a:extLst>
+              </a:tr>
+              <a:tr h="0">
+                <a:tc>
+                  <a:txBody>
+                    <a:bodyPr/>
+                    <a:lstStyle/>
+                    <a:p>
+                      <a:r>
+                        <a:rPr lang="en-US" sz="2800" dirty="0"/>
+                        <a:t>FPI</a:t>
+                      </a:r>
+                    </a:p>
+                  </a:txBody>
+                  <a:tcPr marL="85820" marR="85820" marT="42910" marB="42910"/>
+                </a:tc>
+                <a:tc>
+                  <a:txBody>
+                    <a:bodyPr/>
+                    <a:lstStyle/>
+                    <a:p>
+                      <a:r>
+                        <a:rPr lang="en-US" sz="2800" dirty="0"/>
+                        <a:t>0.75</a:t>
+                      </a:r>
+                    </a:p>
+                  </a:txBody>
+                  <a:tcPr marL="85820" marR="85820" marT="42910" marB="42910"/>
+                </a:tc>
+                <a:tc>
+                  <a:txBody>
+                    <a:bodyPr/>
+                    <a:lstStyle/>
+                    <a:p>
+                      <a:r>
+                        <a:rPr lang="en-US" sz="2800" dirty="0"/>
+                        <a:t>768.0</a:t>
+                      </a:r>
+                    </a:p>
+                  </a:txBody>
+                  <a:tcPr marL="85820" marR="85820" marT="42910" marB="42910"/>
+                </a:tc>
+                <a:extLst>
+                  <a:ext uri="{0D108BD9-81ED-4DB2-BD59-A6C34878D82A}">
+                    <a16:rowId xmlns:a16="http://schemas.microsoft.com/office/drawing/2014/main" val="1972306194"/>
+                  </a:ext>
+                </a:extLst>
+              </a:tr>
+              <a:tr h="0">
+                <a:tc>
+                  <a:txBody>
+                    <a:bodyPr/>
+                    <a:lstStyle/>
+                    <a:p>
+                      <a:r>
+                        <a:rPr lang="en-US" sz="2800" dirty="0"/>
+                        <a:t>DFPI</a:t>
+                      </a:r>
+                    </a:p>
+                  </a:txBody>
+                  <a:tcPr marL="85820" marR="85820" marT="42910" marB="42910"/>
+                </a:tc>
+                <a:tc>
+                  <a:txBody>
+                    <a:bodyPr/>
+                    <a:lstStyle/>
+                    <a:p>
+                      <a:endParaRPr lang="en-US" sz="2800" dirty="0"/>
+                    </a:p>
+                  </a:txBody>
+                  <a:tcPr marL="85820" marR="85820" marT="42910" marB="42910"/>
+                </a:tc>
+                <a:tc>
+                  <a:txBody>
+                    <a:bodyPr/>
+                    <a:lstStyle/>
+                    <a:p>
+                      <a:endParaRPr lang="en-US" sz="2800" dirty="0"/>
+                    </a:p>
+                  </a:txBody>
+                  <a:tcPr marL="85820" marR="85820" marT="42910" marB="42910"/>
+                </a:tc>
+                <a:extLst>
+                  <a:ext uri="{0D108BD9-81ED-4DB2-BD59-A6C34878D82A}">
+                    <a16:rowId xmlns:a16="http://schemas.microsoft.com/office/drawing/2014/main" val="458128511"/>
+                  </a:ext>
+                </a:extLst>
+              </a:tr>
+            </a:tbl>
+          </a:graphicData>
+        </a:graphic>
+      </p:graphicFrame>
+      <p:sp>
+        <p:nvSpPr>
+          <p:cNvPr id="46" name="Rounded Rectangle 24">
+            <a:extLst>
+              <a:ext uri="{FF2B5EF4-FFF2-40B4-BE49-F238E27FC236}">
+                <a16:creationId xmlns:a16="http://schemas.microsoft.com/office/drawing/2014/main" id="{5410958B-05C5-4126-B86A-88D07603E881}"/>
+              </a:ext>
+            </a:extLst>
+          </p:cNvPr>
+          <p:cNvSpPr/>
+          <p:nvPr/>
+        </p:nvSpPr>
+        <p:spPr>
+          <a:xfrm>
+            <a:off x="23118546" y="12649917"/>
+            <a:ext cx="9444849" cy="6584379"/>
+          </a:xfrm>
+          <a:prstGeom prst="roundRect">
+            <a:avLst>
+              <a:gd name="adj" fmla="val 3786"/>
+            </a:avLst>
+          </a:prstGeom>
+          <a:noFill/>
+          <a:ln w="57150">
+            <a:solidFill>
+              <a:srgbClr val="C00000"/>
+            </a:solidFill>
+          </a:ln>
+        </p:spPr>
+        <p:style>
+          <a:lnRef idx="2">
+            <a:schemeClr val="accent1">
+              <a:shade val="50000"/>
+            </a:schemeClr>
+          </a:lnRef>
+          <a:fillRef idx="1">
+            <a:schemeClr val="accent1"/>
+          </a:fillRef>
+          <a:effectRef idx="0">
+            <a:schemeClr val="accent1"/>
+          </a:effectRef>
+          <a:fontRef idx="minor">
+            <a:schemeClr val="lt1"/>
+          </a:fontRef>
+        </p:style>
+        <p:txBody>
+          <a:bodyPr lIns="78373" tIns="39187" rIns="78373" bIns="39187" anchor="ctr"/>
+          <a:lstStyle/>
+          <a:p>
+            <a:pPr algn="ctr" defTabSz="3134677" eaLnBrk="1" hangingPunct="1">
+              <a:defRPr/>
+            </a:pPr>
+            <a:endParaRPr kumimoji="0" lang="zh-TW" altLang="en-US" sz="5166">
+              <a:solidFill>
+                <a:srgbClr val="FFFFFF"/>
+              </a:solidFill>
+              <a:latin typeface="Helvetica" pitchFamily="34" charset="0"/>
+            </a:endParaRPr>
+          </a:p>
+        </p:txBody>
+      </p:sp>
+      <p:sp>
+        <p:nvSpPr>
+          <p:cNvPr id="48" name="TextBox 113">
+            <a:extLst>
+              <a:ext uri="{FF2B5EF4-FFF2-40B4-BE49-F238E27FC236}">
+                <a16:creationId xmlns:a16="http://schemas.microsoft.com/office/drawing/2014/main" id="{D5EA85A8-438C-4A60-8F4E-04F5DAAFA7D0}"/>
+              </a:ext>
+            </a:extLst>
+          </p:cNvPr>
+          <p:cNvSpPr txBox="1">
+            <a:spLocks noChangeArrowheads="1"/>
+          </p:cNvSpPr>
+          <p:nvPr/>
+        </p:nvSpPr>
+        <p:spPr bwMode="auto">
+          <a:xfrm>
+            <a:off x="23341640" y="12801600"/>
+            <a:ext cx="8998660" cy="756248"/>
+          </a:xfrm>
+          <a:prstGeom prst="rect">
+            <a:avLst/>
+          </a:prstGeom>
+          <a:noFill/>
+          <a:ln>
+            <a:noFill/>
+          </a:ln>
+          <a:extLst>
+            <a:ext uri="{909E8E84-426E-40DD-AFC4-6F175D3DCCD1}">
+              <a14:hiddenFill xmlns:a14="http://schemas.microsoft.com/office/drawing/2010/main">
+                <a:solidFill>
+                  <a:srgbClr val="FFFFFF"/>
+                </a:solidFill>
+              </a14:hiddenFill>
+            </a:ext>
+            <a:ext uri="{91240B29-F687-4F45-9708-019B960494DF}">
+              <a14:hiddenLine xmlns:a14="http://schemas.microsoft.com/office/drawing/2010/main" w="9525">
+                <a:solidFill>
+                  <a:srgbClr val="000000"/>
+                </a:solidFill>
+                <a:miter lim="800000"/>
+                <a:headEnd/>
+                <a:tailEnd/>
+              </a14:hiddenLine>
+            </a:ext>
+          </a:extLst>
+        </p:spPr>
+        <p:txBody>
+          <a:bodyPr wrap="square" lIns="78373" tIns="39187" rIns="78373" bIns="39187">
+            <a:spAutoFit/>
+          </a:bodyPr>
+          <a:lstStyle>
+            <a:lvl1pPr eaLnBrk="0" hangingPunct="0">
+              <a:defRPr kumimoji="1" sz="6200">
+                <a:solidFill>
+                  <a:schemeClr val="tx1"/>
+                </a:solidFill>
+                <a:latin typeface="Arial" panose="020B0604020202020204" pitchFamily="34" charset="0"/>
+                <a:ea typeface="PMingLiU" panose="02020500000000000000" pitchFamily="18" charset="-120"/>
+              </a:defRPr>
+            </a:lvl1pPr>
+            <a:lvl2pPr marL="742950" indent="-285750" eaLnBrk="0" hangingPunct="0">
+              <a:defRPr kumimoji="1" sz="6200">
+                <a:solidFill>
+                  <a:schemeClr val="tx1"/>
+                </a:solidFill>
+                <a:latin typeface="Arial" panose="020B0604020202020204" pitchFamily="34" charset="0"/>
+                <a:ea typeface="PMingLiU" panose="02020500000000000000" pitchFamily="18" charset="-120"/>
+              </a:defRPr>
+            </a:lvl2pPr>
+            <a:lvl3pPr marL="1143000" indent="-228600" eaLnBrk="0" hangingPunct="0">
+              <a:defRPr kumimoji="1" sz="6200">
+                <a:solidFill>
+                  <a:schemeClr val="tx1"/>
+                </a:solidFill>
+                <a:latin typeface="Arial" panose="020B0604020202020204" pitchFamily="34" charset="0"/>
+                <a:ea typeface="PMingLiU" panose="02020500000000000000" pitchFamily="18" charset="-120"/>
+              </a:defRPr>
+            </a:lvl3pPr>
+            <a:lvl4pPr marL="1600200" indent="-228600" eaLnBrk="0" hangingPunct="0">
+              <a:defRPr kumimoji="1" sz="6200">
+                <a:solidFill>
+                  <a:schemeClr val="tx1"/>
+                </a:solidFill>
+                <a:latin typeface="Arial" panose="020B0604020202020204" pitchFamily="34" charset="0"/>
+                <a:ea typeface="PMingLiU" panose="02020500000000000000" pitchFamily="18" charset="-120"/>
+              </a:defRPr>
+            </a:lvl4pPr>
+            <a:lvl5pPr marL="2057400" indent="-228600" eaLnBrk="0" hangingPunct="0">
+              <a:defRPr kumimoji="1" sz="6200">
+                <a:solidFill>
+                  <a:schemeClr val="tx1"/>
+                </a:solidFill>
+                <a:latin typeface="Arial" panose="020B0604020202020204" pitchFamily="34" charset="0"/>
+                <a:ea typeface="PMingLiU" panose="02020500000000000000" pitchFamily="18" charset="-120"/>
+              </a:defRPr>
+            </a:lvl5pPr>
+            <a:lvl6pPr marL="2514600" indent="-228600" defTabSz="3133725" eaLnBrk="0" fontAlgn="base" hangingPunct="0">
+              <a:spcBef>
+                <a:spcPct val="0"/>
+              </a:spcBef>
+              <a:spcAft>
+                <a:spcPct val="0"/>
+              </a:spcAft>
+              <a:defRPr kumimoji="1" sz="6200">
+                <a:solidFill>
+                  <a:schemeClr val="tx1"/>
+                </a:solidFill>
+                <a:latin typeface="Arial" panose="020B0604020202020204" pitchFamily="34" charset="0"/>
+                <a:ea typeface="PMingLiU" panose="02020500000000000000" pitchFamily="18" charset="-120"/>
+              </a:defRPr>
+            </a:lvl6pPr>
+            <a:lvl7pPr marL="2971800" indent="-228600" defTabSz="3133725" eaLnBrk="0" fontAlgn="base" hangingPunct="0">
+              <a:spcBef>
+                <a:spcPct val="0"/>
+              </a:spcBef>
+              <a:spcAft>
+                <a:spcPct val="0"/>
+              </a:spcAft>
+              <a:defRPr kumimoji="1" sz="6200">
+                <a:solidFill>
+                  <a:schemeClr val="tx1"/>
+                </a:solidFill>
+                <a:latin typeface="Arial" panose="020B0604020202020204" pitchFamily="34" charset="0"/>
+                <a:ea typeface="PMingLiU" panose="02020500000000000000" pitchFamily="18" charset="-120"/>
+              </a:defRPr>
+            </a:lvl7pPr>
+            <a:lvl8pPr marL="3429000" indent="-228600" defTabSz="3133725" eaLnBrk="0" fontAlgn="base" hangingPunct="0">
+              <a:spcBef>
+                <a:spcPct val="0"/>
+              </a:spcBef>
+              <a:spcAft>
+                <a:spcPct val="0"/>
+              </a:spcAft>
+              <a:defRPr kumimoji="1" sz="6200">
+                <a:solidFill>
+                  <a:schemeClr val="tx1"/>
+                </a:solidFill>
+                <a:latin typeface="Arial" panose="020B0604020202020204" pitchFamily="34" charset="0"/>
+                <a:ea typeface="PMingLiU" panose="02020500000000000000" pitchFamily="18" charset="-120"/>
+              </a:defRPr>
+            </a:lvl8pPr>
+            <a:lvl9pPr marL="3886200" indent="-228600" defTabSz="3133725" eaLnBrk="0" fontAlgn="base" hangingPunct="0">
+              <a:spcBef>
+                <a:spcPct val="0"/>
+              </a:spcBef>
+              <a:spcAft>
+                <a:spcPct val="0"/>
+              </a:spcAft>
+              <a:defRPr kumimoji="1" sz="6200">
+                <a:solidFill>
+                  <a:schemeClr val="tx1"/>
+                </a:solidFill>
+                <a:latin typeface="Arial" panose="020B0604020202020204" pitchFamily="34" charset="0"/>
+                <a:ea typeface="PMingLiU" panose="02020500000000000000" pitchFamily="18" charset="-120"/>
+              </a:defRPr>
+            </a:lvl9pPr>
+          </a:lstStyle>
+          <a:p>
+            <a:pPr algn="ctr" defTabSz="3133475" eaLnBrk="1" hangingPunct="1">
+              <a:defRPr/>
+            </a:pPr>
+            <a:r>
+              <a:rPr kumimoji="0" lang="en-US" altLang="zh-TW" sz="4400" b="1" dirty="0">
+                <a:latin typeface="Helvetica" panose="020B0604020202020204" pitchFamily="34" charset="0"/>
+              </a:rPr>
+              <a:t>Discussion</a:t>
+            </a:r>
+            <a:endParaRPr kumimoji="0" lang="zh-TW" altLang="en-US" sz="4400" b="1" dirty="0">
+              <a:latin typeface="Helvetica" panose="020B0604020202020204" pitchFamily="34" charset="0"/>
+            </a:endParaRPr>
+          </a:p>
+        </p:txBody>
+      </p:sp>
     </p:spTree>
   </p:cSld>
   <p:clrMapOvr>

</xml_diff>

<commit_message>
More poster updates, discussion and future work
</commit_message>
<xml_diff>
--- a/poster.pptx
+++ b/poster.pptx
@@ -4376,10 +4376,10 @@
       </p:grpSpPr>
       <p:grpSp>
         <p:nvGrpSpPr>
-          <p:cNvPr id="4" name="Group 3">
+          <p:cNvPr id="8" name="Group 7">
             <a:extLst>
               <a:ext uri="{FF2B5EF4-FFF2-40B4-BE49-F238E27FC236}">
-                <a16:creationId xmlns:a16="http://schemas.microsoft.com/office/drawing/2014/main" xmlns="" id="{C234E05C-172B-40CF-8F3B-7C14F7150500}"/>
+                <a16:creationId xmlns:a16="http://schemas.microsoft.com/office/drawing/2014/main" id="{2985542E-0337-42E4-9DE0-784157E9AC30}"/>
               </a:ext>
             </a:extLst>
           </p:cNvPr>
@@ -4388,10 +4388,10 @@
         </p:nvGrpSpPr>
         <p:grpSpPr>
           <a:xfrm>
-            <a:off x="9287421" y="14637566"/>
-            <a:ext cx="12877800" cy="6547652"/>
-            <a:chOff x="9296400" y="11557728"/>
-            <a:chExt cx="12877800" cy="6547652"/>
+            <a:off x="9285514" y="14144250"/>
+            <a:ext cx="8304095" cy="6978539"/>
+            <a:chOff x="9285514" y="14144250"/>
+            <a:chExt cx="8304095" cy="6978539"/>
           </a:xfrm>
         </p:grpSpPr>
         <p:sp>
@@ -4399,7 +4399,7 @@
             <p:cNvPr id="36" name="TextBox 35">
               <a:extLst>
                 <a:ext uri="{FF2B5EF4-FFF2-40B4-BE49-F238E27FC236}">
-                  <a16:creationId xmlns:a16="http://schemas.microsoft.com/office/drawing/2014/main" xmlns="" id="{A1529AC7-8E1C-4CB5-B8DC-53E9D5C05110}"/>
+                  <a16:creationId xmlns:a16="http://schemas.microsoft.com/office/drawing/2014/main" id="{A1529AC7-8E1C-4CB5-B8DC-53E9D5C05110}"/>
                 </a:ext>
               </a:extLst>
             </p:cNvPr>
@@ -4408,8 +4408,8 @@
           </p:nvSpPr>
           <p:spPr>
             <a:xfrm>
-              <a:off x="9296400" y="11557728"/>
-              <a:ext cx="12877800" cy="3708708"/>
+              <a:off x="9285514" y="14144250"/>
+              <a:ext cx="8304095" cy="4139595"/>
             </a:xfrm>
             <a:prstGeom prst="rect">
               <a:avLst/>
@@ -4450,6 +4450,39 @@
                   <a:ea typeface="Helvetica" charset="0"/>
                   <a:cs typeface="Helvetica" charset="0"/>
                 </a:rPr>
+                <a:t>Fit a model that predicts the path </a:t>
+              </a:r>
+              <a:r>
+                <a:rPr lang="en-US" sz="2800" i="1" dirty="0">
+                  <a:latin typeface="Helvetica" charset="0"/>
+                  <a:ea typeface="Helvetica" charset="0"/>
+                  <a:cs typeface="Helvetica" charset="0"/>
+                </a:rPr>
+                <a:t>in general </a:t>
+              </a:r>
+              <a:r>
+                <a:rPr lang="en-US" sz="2800" dirty="0">
+                  <a:latin typeface="Helvetica" charset="0"/>
+                  <a:ea typeface="Helvetica" charset="0"/>
+                  <a:cs typeface="Helvetica" charset="0"/>
+                </a:rPr>
+                <a:t>(not for a specific map)</a:t>
+              </a:r>
+            </a:p>
+            <a:p>
+              <a:pPr marL="457200" indent="-457200" algn="just">
+                <a:spcAft>
+                  <a:spcPts val="600"/>
+                </a:spcAft>
+                <a:buFont typeface="Arial" panose="020B0604020202020204" pitchFamily="34" charset="0"/>
+                <a:buChar char="•"/>
+              </a:pPr>
+              <a:r>
+                <a:rPr lang="en-US" sz="2800" dirty="0">
+                  <a:latin typeface="Helvetica" charset="0"/>
+                  <a:ea typeface="Helvetica" charset="0"/>
+                  <a:cs typeface="Helvetica" charset="0"/>
+                </a:rPr>
                 <a:t>State space is continuous and high-dimensional</a:t>
               </a:r>
             </a:p>
@@ -4471,7 +4504,7 @@
               </a:r>
             </a:p>
             <a:p>
-              <a:pPr marL="457200" indent="-457200" algn="just">
+              <a:pPr marL="457200" indent="-457200">
                 <a:spcAft>
                   <a:spcPts val="600"/>
                 </a:spcAft>
@@ -4484,22 +4517,16 @@
                   <a:ea typeface="Helvetica" charset="0"/>
                   <a:cs typeface="Helvetica" charset="0"/>
                 </a:rPr>
-                <a:t>Instead, estimate the policy directly</a:t>
+                <a:t>Instead, </a:t>
               </a:r>
-            </a:p>
-            <a:p>
-              <a:pPr marL="457200" indent="-457200" algn="just">
-                <a:spcAft>
-                  <a:spcPts val="600"/>
-                </a:spcAft>
-                <a:buFont typeface="Arial" panose="020B0604020202020204" pitchFamily="34" charset="0"/>
-                <a:buChar char="•"/>
-              </a:pPr>
-              <a:endParaRPr lang="en-US" sz="2800" dirty="0">
-                <a:latin typeface="Helvetica" charset="0"/>
-                <a:ea typeface="Helvetica" charset="0"/>
-                <a:cs typeface="Helvetica" charset="0"/>
-              </a:endParaRPr>
+              <a:r>
+                <a:rPr lang="en-US" sz="2800" i="1" dirty="0">
+                  <a:latin typeface="Helvetica" charset="0"/>
+                  <a:ea typeface="Helvetica" charset="0"/>
+                  <a:cs typeface="Helvetica" charset="0"/>
+                </a:rPr>
+                <a:t>estimate the policy directly</a:t>
+              </a:r>
             </a:p>
             <a:p>
               <a:pPr marL="457200" indent="-457200" algn="just">
@@ -4537,10 +4564,10 @@
         <p:pic>
           <p:nvPicPr>
             <p:cNvPr id="1026" name="Picture 2" descr="https://lh4.googleusercontent.com/WdkdgXFacQoSzg_Q_WW_EiFhKwiD35ot2n_tdfRim_ct4viJq9_n99fD_W4J5lLHF0f0wF0TmmdwgXjtr0YKNN7aHMxH9QCmNgFVitNs4tJSEyRpOfeQV4YDpsiEpaub783Q12Gd">
-              <a:hlinkClick r:id=""/>
+              <a:hlinkClick r:id="" action="ppaction://noaction"/>
               <a:extLst>
                 <a:ext uri="{FF2B5EF4-FFF2-40B4-BE49-F238E27FC236}">
-                  <a16:creationId xmlns:a16="http://schemas.microsoft.com/office/drawing/2014/main" xmlns="" id="{484DA3AD-435B-4BE1-9E8D-C5AC66FA885B}"/>
+                  <a16:creationId xmlns:a16="http://schemas.microsoft.com/office/drawing/2014/main" id="{484DA3AD-435B-4BE1-9E8D-C5AC66FA885B}"/>
                 </a:ext>
               </a:extLst>
             </p:cNvPr>
@@ -4564,7 +4591,7 @@
           </p:blipFill>
           <p:spPr bwMode="auto">
             <a:xfrm>
-              <a:off x="14321136" y="13935016"/>
+              <a:off x="11828030" y="17289831"/>
               <a:ext cx="2665753" cy="496724"/>
             </a:xfrm>
             <a:prstGeom prst="rect">
@@ -4588,7 +4615,7 @@
               <a:hlinkClick r:id="rId4"/>
               <a:extLst>
                 <a:ext uri="{FF2B5EF4-FFF2-40B4-BE49-F238E27FC236}">
-                  <a16:creationId xmlns:a16="http://schemas.microsoft.com/office/drawing/2014/main" xmlns="" id="{9E46EC36-E68A-4DF3-ACAE-673C7C7CC2ED}"/>
+                  <a16:creationId xmlns:a16="http://schemas.microsoft.com/office/drawing/2014/main" id="{9E46EC36-E68A-4DF3-ACAE-673C7C7CC2ED}"/>
                 </a:ext>
               </a:extLst>
             </p:cNvPr>
@@ -4612,7 +4639,7 @@
           </p:blipFill>
           <p:spPr bwMode="auto">
             <a:xfrm>
-              <a:off x="12157217" y="15239923"/>
+              <a:off x="9973435" y="18465923"/>
               <a:ext cx="6993589" cy="1020803"/>
             </a:xfrm>
             <a:prstGeom prst="rect">
@@ -4635,7 +4662,7 @@
             <p:cNvPr id="39" name="TextBox 38">
               <a:extLst>
                 <a:ext uri="{FF2B5EF4-FFF2-40B4-BE49-F238E27FC236}">
-                  <a16:creationId xmlns:a16="http://schemas.microsoft.com/office/drawing/2014/main" xmlns="" id="{A34C754B-4136-4C59-B0A0-0EEB6301249C}"/>
+                  <a16:creationId xmlns:a16="http://schemas.microsoft.com/office/drawing/2014/main" id="{A34C754B-4136-4C59-B0A0-0EEB6301249C}"/>
                 </a:ext>
               </a:extLst>
             </p:cNvPr>
@@ -4644,8 +4671,8 @@
           </p:nvSpPr>
           <p:spPr>
             <a:xfrm>
-              <a:off x="9296400" y="16935829"/>
-              <a:ext cx="12877800" cy="1169551"/>
+              <a:off x="9285514" y="19522351"/>
+              <a:ext cx="8293209" cy="1600438"/>
             </a:xfrm>
             <a:prstGeom prst="rect">
               <a:avLst/>
@@ -4686,7 +4713,7 @@
                   <a:ea typeface="Helvetica" charset="0"/>
                   <a:cs typeface="Helvetica" charset="0"/>
                 </a:rPr>
-                <a:t>Use neural network to improve approximation</a:t>
+                <a:t>Use a single layer feed forward neural network to improve policy approximation</a:t>
               </a:r>
             </a:p>
           </p:txBody>
@@ -4810,10 +4837,10 @@
         </p:nvGrpSpPr>
         <p:grpSpPr>
           <a:xfrm>
-            <a:off x="23111124" y="19639512"/>
-            <a:ext cx="9259491" cy="5594950"/>
-            <a:chOff x="17830800" y="12649200"/>
-            <a:chExt cx="9372600" cy="2498577"/>
+            <a:off x="23111124" y="22734395"/>
+            <a:ext cx="9452271" cy="2500063"/>
+            <a:chOff x="17830800" y="14031303"/>
+            <a:chExt cx="9567735" cy="1116471"/>
           </a:xfrm>
         </p:grpSpPr>
         <p:sp>
@@ -4824,8 +4851,8 @@
           </p:nvSpPr>
           <p:spPr>
             <a:xfrm>
-              <a:off x="17830800" y="12649200"/>
-              <a:ext cx="9372600" cy="2498577"/>
+              <a:off x="17830800" y="14031303"/>
+              <a:ext cx="9567735" cy="1116471"/>
             </a:xfrm>
             <a:prstGeom prst="roundRect">
               <a:avLst/>
@@ -4879,8 +4906,8 @@
           </p:nvSpPr>
           <p:spPr bwMode="auto">
             <a:xfrm>
-              <a:off x="17838313" y="12772659"/>
-              <a:ext cx="9108583" cy="650725"/>
+              <a:off x="17941772" y="14031303"/>
+              <a:ext cx="9108583" cy="337723"/>
             </a:xfrm>
             <a:prstGeom prst="rect">
               <a:avLst/>
@@ -5030,9 +5057,6 @@
                 </a:rPr>
                 <a:t>References</a:t>
               </a:r>
-              <a:endParaRPr kumimoji="0" lang="zh-TW" altLang="en-US" sz="4400" b="1" dirty="0">
-                <a:latin typeface="Helvetica" panose="020B0604020202020204" pitchFamily="34" charset="0"/>
-              </a:endParaRPr>
             </a:p>
           </p:txBody>
         </p:sp>
@@ -5164,7 +5188,7 @@
           <p:cNvPr id="35" name="Rounded Rectangle 654">
             <a:extLst>
               <a:ext uri="{FF2B5EF4-FFF2-40B4-BE49-F238E27FC236}">
-                <a16:creationId xmlns:a16="http://schemas.microsoft.com/office/drawing/2014/main" xmlns="" id="{E749ACD6-E9F9-4429-AB23-DDA49C3E06EA}"/>
+                <a16:creationId xmlns:a16="http://schemas.microsoft.com/office/drawing/2014/main" id="{E749ACD6-E9F9-4429-AB23-DDA49C3E06EA}"/>
               </a:ext>
             </a:extLst>
           </p:cNvPr>
@@ -5225,7 +5249,7 @@
           <p:cNvPr id="114" name="Rounded Rectangle 24">
             <a:extLst>
               <a:ext uri="{FF2B5EF4-FFF2-40B4-BE49-F238E27FC236}">
-                <a16:creationId xmlns:a16="http://schemas.microsoft.com/office/drawing/2014/main" xmlns="" id="{8CCF5CB2-8AD1-4F04-8EAA-EF03AD901465}"/>
+                <a16:creationId xmlns:a16="http://schemas.microsoft.com/office/drawing/2014/main" id="{8CCF5CB2-8AD1-4F04-8EAA-EF03AD901465}"/>
               </a:ext>
             </a:extLst>
           </p:cNvPr>
@@ -5286,7 +5310,7 @@
           <p:cNvPr id="115" name="TextBox 113">
             <a:extLst>
               <a:ext uri="{FF2B5EF4-FFF2-40B4-BE49-F238E27FC236}">
-                <a16:creationId xmlns:a16="http://schemas.microsoft.com/office/drawing/2014/main" xmlns="" id="{F02AE63F-7CE3-48DD-8696-389C9282E694}"/>
+                <a16:creationId xmlns:a16="http://schemas.microsoft.com/office/drawing/2014/main" id="{F02AE63F-7CE3-48DD-8696-389C9282E694}"/>
               </a:ext>
             </a:extLst>
           </p:cNvPr>
@@ -5459,7 +5483,7 @@
           <p:cNvPr id="116" name="TextBox 113">
             <a:extLst>
               <a:ext uri="{FF2B5EF4-FFF2-40B4-BE49-F238E27FC236}">
-                <a16:creationId xmlns:a16="http://schemas.microsoft.com/office/drawing/2014/main" xmlns="" id="{31E3D9EC-D379-4B01-AFF3-4F2B190B3937}"/>
+                <a16:creationId xmlns:a16="http://schemas.microsoft.com/office/drawing/2014/main" id="{31E3D9EC-D379-4B01-AFF3-4F2B190B3937}"/>
               </a:ext>
             </a:extLst>
           </p:cNvPr>
@@ -5632,7 +5656,7 @@
           <p:cNvPr id="126" name="TextBox 113">
             <a:extLst>
               <a:ext uri="{FF2B5EF4-FFF2-40B4-BE49-F238E27FC236}">
-                <a16:creationId xmlns:a16="http://schemas.microsoft.com/office/drawing/2014/main" xmlns="" id="{10C3C321-8435-499D-83BD-CE46DFE8C3A3}"/>
+                <a16:creationId xmlns:a16="http://schemas.microsoft.com/office/drawing/2014/main" id="{10C3C321-8435-499D-83BD-CE46DFE8C3A3}"/>
               </a:ext>
             </a:extLst>
           </p:cNvPr>
@@ -5805,7 +5829,7 @@
           <p:cNvPr id="128" name="TextBox 113">
             <a:extLst>
               <a:ext uri="{FF2B5EF4-FFF2-40B4-BE49-F238E27FC236}">
-                <a16:creationId xmlns:a16="http://schemas.microsoft.com/office/drawing/2014/main" xmlns="" id="{35E67E23-ADED-4EB5-AD59-399A47CA488A}"/>
+                <a16:creationId xmlns:a16="http://schemas.microsoft.com/office/drawing/2014/main" id="{35E67E23-ADED-4EB5-AD59-399A47CA488A}"/>
               </a:ext>
             </a:extLst>
           </p:cNvPr>
@@ -5982,7 +6006,7 @@
         <p:spPr>
           <a:xfrm>
             <a:off x="604131" y="14616456"/>
-            <a:ext cx="7294012" cy="4031873"/>
+            <a:ext cx="7294012" cy="3170099"/>
           </a:xfrm>
           <a:prstGeom prst="rect">
             <a:avLst/>
@@ -6005,15 +6029,7 @@
                 <a:ea typeface="Helvetica" charset="0"/>
                 <a:cs typeface="Helvetica" charset="0"/>
               </a:rPr>
-              <a:t>Randomly generated with 1-8 circular </a:t>
-            </a:r>
-            <a:r>
-              <a:rPr lang="en-US" sz="2800" dirty="0" smtClean="0">
-                <a:latin typeface="Helvetica" charset="0"/>
-                <a:ea typeface="Helvetica" charset="0"/>
-                <a:cs typeface="Helvetica" charset="0"/>
-              </a:rPr>
-              <a:t>obstacles</a:t>
+              <a:t>Randomly generated with 1-8 circular obstacles</a:t>
             </a:r>
           </a:p>
           <a:p>
@@ -6021,7 +6037,7 @@
               <a:buFont typeface="Arial" panose="020B0604020202020204" pitchFamily="34" charset="0"/>
               <a:buChar char="•"/>
             </a:pPr>
-            <a:endParaRPr lang="en-US" sz="1600" dirty="0" smtClean="0">
+            <a:endParaRPr lang="en-US" sz="1600" dirty="0">
               <a:latin typeface="Helvetica" charset="0"/>
               <a:ea typeface="Helvetica" charset="0"/>
               <a:cs typeface="Helvetica" charset="0"/>
@@ -6032,26 +6048,17 @@
               <a:buFont typeface="Arial" panose="020B0604020202020204" pitchFamily="34" charset="0"/>
               <a:buChar char="•"/>
             </a:pPr>
-            <a:r>
-              <a:rPr lang="en-US" sz="2800" dirty="0" smtClean="0">
-                <a:latin typeface="Helvetica" charset="0"/>
-                <a:ea typeface="Helvetica" charset="0"/>
-                <a:cs typeface="Helvetica" charset="0"/>
-              </a:rPr>
-              <a:t>Rejected </a:t>
-            </a:r>
             <a:r>
               <a:rPr lang="en-US" sz="2800" dirty="0">
                 <a:latin typeface="Helvetica" charset="0"/>
                 <a:ea typeface="Helvetica" charset="0"/>
                 <a:cs typeface="Helvetica" charset="0"/>
               </a:rPr>
-              <a:t>obstacles covering endpoints. </a:t>
-            </a:r>
-          </a:p>
-          <a:p>
-            <a:pPr algn="just"/>
-            <a:endParaRPr lang="en-US" sz="1600" dirty="0" smtClean="0">
+              <a:t>Rejected obstacles covering endpoints. </a:t>
+            </a:r>
+          </a:p>
+          <a:p>
+            <a:endParaRPr lang="en-US" sz="1600" dirty="0">
               <a:latin typeface="Helvetica" charset="0"/>
               <a:ea typeface="Helvetica" charset="0"/>
               <a:cs typeface="Helvetica" charset="0"/>
@@ -6063,12 +6070,12 @@
               <a:buChar char="•"/>
             </a:pPr>
             <a:r>
-              <a:rPr lang="en-US" sz="2800" dirty="0" smtClean="0">
+              <a:rPr lang="en-US" sz="2800" b="1" dirty="0">
                 <a:latin typeface="Helvetica" charset="0"/>
                 <a:ea typeface="Helvetica" charset="0"/>
                 <a:cs typeface="Helvetica" charset="0"/>
               </a:rPr>
-              <a:t>The </a:t>
+              <a:t>Goal: </a:t>
             </a:r>
             <a:r>
               <a:rPr lang="en-US" sz="2800" dirty="0">
@@ -6076,7 +6083,7 @@
                 <a:ea typeface="Helvetica" charset="0"/>
                 <a:cs typeface="Helvetica" charset="0"/>
               </a:rPr>
-              <a:t>goal was to plan a path within the boundary and outside of the obstacles, where a path was a sequence of points with adjacent points no more than 1 unit apart.</a:t>
+              <a:t>Plan a path within the boundary and outside of the obstacles (path is a sequence of unit spaced points)</a:t>
             </a:r>
           </a:p>
         </p:txBody>
@@ -6141,15 +6148,7 @@
                 <a:ea typeface="Helvetica" charset="0"/>
                 <a:cs typeface="Helvetica" charset="0"/>
               </a:rPr>
-              <a:t>Approximates the best path by finding the shortest path in a space-filling </a:t>
-            </a:r>
-            <a:r>
-              <a:rPr lang="en-US" sz="2800" dirty="0" smtClean="0">
-                <a:latin typeface="Helvetica" charset="0"/>
-                <a:ea typeface="Helvetica" charset="0"/>
-                <a:cs typeface="Helvetica" charset="0"/>
-              </a:rPr>
-              <a:t>graph</a:t>
+              <a:t>Approximates the best path by finding the shortest path in a space-filling graph</a:t>
             </a:r>
           </a:p>
           <a:p>
@@ -6168,17 +6167,6 @@
               <a:buFont typeface="Arial" panose="020B0604020202020204" pitchFamily="34" charset="0"/>
               <a:buChar char="•"/>
             </a:pPr>
-            <a:endParaRPr lang="en-US" sz="2800" dirty="0" smtClean="0">
-              <a:latin typeface="Helvetica" charset="0"/>
-              <a:ea typeface="Helvetica" charset="0"/>
-              <a:cs typeface="Helvetica" charset="0"/>
-            </a:endParaRPr>
-          </a:p>
-          <a:p>
-            <a:pPr marL="514350" indent="-514350" algn="just">
-              <a:buFont typeface="Arial" panose="020B0604020202020204" pitchFamily="34" charset="0"/>
-              <a:buChar char="•"/>
-            </a:pPr>
             <a:endParaRPr lang="en-US" sz="2800" dirty="0">
               <a:latin typeface="Helvetica" charset="0"/>
               <a:ea typeface="Helvetica" charset="0"/>
@@ -6190,7 +6178,18 @@
               <a:buFont typeface="Arial" panose="020B0604020202020204" pitchFamily="34" charset="0"/>
               <a:buChar char="•"/>
             </a:pPr>
-            <a:endParaRPr lang="en-US" sz="2800" dirty="0" smtClean="0">
+            <a:endParaRPr lang="en-US" sz="2800" dirty="0">
+              <a:latin typeface="Helvetica" charset="0"/>
+              <a:ea typeface="Helvetica" charset="0"/>
+              <a:cs typeface="Helvetica" charset="0"/>
+            </a:endParaRPr>
+          </a:p>
+          <a:p>
+            <a:pPr marL="514350" indent="-514350" algn="just">
+              <a:buFont typeface="Arial" panose="020B0604020202020204" pitchFamily="34" charset="0"/>
+              <a:buChar char="•"/>
+            </a:pPr>
+            <a:endParaRPr lang="en-US" sz="2800" dirty="0">
               <a:latin typeface="Helvetica" charset="0"/>
               <a:ea typeface="Helvetica" charset="0"/>
               <a:cs typeface="Helvetica" charset="0"/>
@@ -6232,21 +6231,8 @@
                 <a:ea typeface="Helvetica" charset="0"/>
                 <a:cs typeface="Helvetica" charset="0"/>
               </a:rPr>
-              <a:t>Uses optimization (gradient descent) to stretch and </a:t>
-            </a:r>
-            <a:r>
-              <a:rPr lang="en-US" sz="2800" dirty="0" smtClean="0">
-                <a:latin typeface="Helvetica" charset="0"/>
-                <a:ea typeface="Helvetica" charset="0"/>
-                <a:cs typeface="Helvetica" charset="0"/>
-              </a:rPr>
-              <a:t>smooth, minimizing</a:t>
-            </a:r>
-            <a:endParaRPr lang="en-US" sz="2800" dirty="0">
-              <a:latin typeface="Helvetica" charset="0"/>
-              <a:ea typeface="Helvetica" charset="0"/>
-              <a:cs typeface="Helvetica" charset="0"/>
-            </a:endParaRPr>
+              <a:t>Uses optimization (gradient descent) to stretch and smooth, minimizing</a:t>
+            </a:r>
           </a:p>
           <a:p>
             <a:pPr algn="just"/>
@@ -6261,14 +6247,14 @@
               <a:buFont typeface="Arial" panose="020B0604020202020204" pitchFamily="34" charset="0"/>
               <a:buChar char="•"/>
             </a:pPr>
-            <a:endParaRPr lang="en-US" sz="2800" dirty="0" smtClean="0">
+            <a:endParaRPr lang="en-US" sz="2800" dirty="0">
               <a:latin typeface="Helvetica" charset="0"/>
               <a:ea typeface="Helvetica" charset="0"/>
               <a:cs typeface="Helvetica" charset="0"/>
             </a:endParaRPr>
           </a:p>
           <a:p>
-            <a:pPr marL="457200" indent="-457200" algn="just">
+            <a:pPr marL="457200" indent="-457200">
               <a:lnSpc>
                 <a:spcPct val="150000"/>
               </a:lnSpc>
@@ -6276,42 +6262,13 @@
               <a:buChar char="•"/>
             </a:pPr>
             <a:r>
-              <a:rPr lang="en-US" sz="2800" dirty="0" smtClean="0">
-                <a:latin typeface="Helvetica" charset="0"/>
-                <a:ea typeface="Helvetica" charset="0"/>
-                <a:cs typeface="Helvetica" charset="0"/>
-              </a:rPr>
-              <a:t>Sigmoid </a:t>
-            </a:r>
-            <a:r>
               <a:rPr lang="en-US" sz="2800" dirty="0">
                 <a:latin typeface="Helvetica" charset="0"/>
                 <a:ea typeface="Helvetica" charset="0"/>
                 <a:cs typeface="Helvetica" charset="0"/>
               </a:rPr>
-              <a:t>represents obstacle </a:t>
-            </a:r>
-            <a:r>
-              <a:rPr lang="en-US" sz="2800" dirty="0" smtClean="0">
-                <a:latin typeface="Helvetica" charset="0"/>
-                <a:ea typeface="Helvetica" charset="0"/>
-                <a:cs typeface="Helvetica" charset="0"/>
-              </a:rPr>
-              <a:t>penalty</a:t>
-            </a:r>
-            <a:r>
-              <a:rPr lang="en-US" sz="2800" dirty="0" smtClean="0">
-                <a:latin typeface="Helvetica" charset="0"/>
-                <a:ea typeface="Helvetica" charset="0"/>
-                <a:cs typeface="Helvetica" charset="0"/>
-              </a:rPr>
-              <a:t>. As</a:t>
-            </a:r>
-            <a:endParaRPr lang="en-US" sz="2800" dirty="0" smtClean="0">
-              <a:latin typeface="Helvetica" charset="0"/>
-              <a:ea typeface="Helvetica" charset="0"/>
-              <a:cs typeface="Helvetica" charset="0"/>
-            </a:endParaRPr>
+              <a:t>Sigmoid represents obstacle penalty. As</a:t>
+            </a:r>
           </a:p>
           <a:p>
             <a:pPr algn="just">
@@ -6325,15 +6282,7 @@
                 <a:ea typeface="Helvetica" charset="0"/>
                 <a:cs typeface="Helvetica" charset="0"/>
               </a:rPr>
-              <a:t> </a:t>
-            </a:r>
-            <a:r>
-              <a:rPr lang="en-US" sz="2800" dirty="0" smtClean="0">
-                <a:latin typeface="Helvetica" charset="0"/>
-                <a:ea typeface="Helvetica" charset="0"/>
-                <a:cs typeface="Helvetica" charset="0"/>
-              </a:rPr>
-              <a:t>    gradient descent converges, we send </a:t>
+              <a:t>     gradient descent converges, we send </a:t>
             </a:r>
           </a:p>
           <a:p>
@@ -6343,18 +6292,13 @@
               </a:lnSpc>
             </a:pPr>
             <a:r>
-              <a:rPr lang="en-US" sz="2800" dirty="0" smtClean="0">
+              <a:rPr lang="en-US" sz="2800" dirty="0">
                 <a:latin typeface="Helvetica" charset="0"/>
                 <a:ea typeface="Helvetica" charset="0"/>
                 <a:cs typeface="Helvetica" charset="0"/>
               </a:rPr>
               <a:t>                       hardening the boundary.</a:t>
             </a:r>
-            <a:endParaRPr lang="en-US" sz="2800" dirty="0">
-              <a:latin typeface="Helvetica" charset="0"/>
-              <a:ea typeface="Helvetica" charset="0"/>
-              <a:cs typeface="Helvetica" charset="0"/>
-            </a:endParaRPr>
           </a:p>
         </p:txBody>
       </p:sp>
@@ -6396,8 +6340,8 @@
         </p:nvSpPr>
         <p:spPr>
           <a:xfrm>
-            <a:off x="23545799" y="20726400"/>
-            <a:ext cx="8578829" cy="1015663"/>
+            <a:off x="23427152" y="23417041"/>
+            <a:ext cx="8578829" cy="1631216"/>
           </a:xfrm>
           <a:prstGeom prst="rect">
             <a:avLst/>
@@ -6434,6 +6378,24 @@
                 <a:cs typeface="Helvetica" panose="020B0604020202020204" pitchFamily="34" charset="0"/>
               </a:rPr>
               <a:t>, "Some thoughts on global path optimization", 2017. [Online]. Available: https://guille.site/path-optimization-thoughts.html. [Accessed: 11- Dec- 2017].</a:t>
+            </a:r>
+          </a:p>
+          <a:p>
+            <a:pPr marL="457200" indent="-457200" algn="just">
+              <a:buFont typeface="+mj-lt"/>
+              <a:buAutoNum type="arabicPeriod"/>
+            </a:pPr>
+            <a:r>
+              <a:rPr lang="en-US" sz="2000" dirty="0"/>
+              <a:t>[2]K. Gregory, V. A, V. Pong and P. </a:t>
+            </a:r>
+            <a:r>
+              <a:rPr lang="en-US" sz="2000" dirty="0" err="1"/>
+              <a:t>Abbeel</a:t>
+            </a:r>
+            <a:r>
+              <a:rPr lang="en-US" sz="2000" dirty="0"/>
+              <a:t>, "Uncertainty-Aware Reinforcement Learning for Collision Avoidance", 2017.</a:t>
             </a:r>
             <a:endParaRPr lang="en-US" sz="2000" dirty="0">
               <a:latin typeface="Helvetica" panose="020B0604020202020204" pitchFamily="34" charset="0"/>
@@ -6565,7 +6527,7 @@
           <p:cNvPr id="33" name="TextBox 32">
             <a:extLst>
               <a:ext uri="{FF2B5EF4-FFF2-40B4-BE49-F238E27FC236}">
-                <a16:creationId xmlns:a16="http://schemas.microsoft.com/office/drawing/2014/main" xmlns="" id="{20A35334-65BE-427E-A6B3-FEE9E459E3DE}"/>
+                <a16:creationId xmlns:a16="http://schemas.microsoft.com/office/drawing/2014/main" id="{20A35334-65BE-427E-A6B3-FEE9E459E3DE}"/>
               </a:ext>
             </a:extLst>
           </p:cNvPr>
@@ -6612,39 +6574,11 @@
               <a:buChar char="•"/>
             </a:pPr>
             <a:r>
-              <a:rPr lang="en-US" sz="2800" dirty="0" smtClean="0">
-                <a:latin typeface="Helvetica" panose="020B0604020202020204" pitchFamily="34" charset="0"/>
-                <a:cs typeface="Helvetica" panose="020B0604020202020204" pitchFamily="34" charset="0"/>
-              </a:rPr>
-              <a:t>This t</a:t>
-            </a:r>
-            <a:r>
-              <a:rPr lang="en-US" sz="2800" dirty="0" smtClean="0">
-                <a:latin typeface="Helvetica" panose="020B0604020202020204" pitchFamily="34" charset="0"/>
-                <a:cs typeface="Helvetica" panose="020B0604020202020204" pitchFamily="34" charset="0"/>
-              </a:rPr>
-              <a:t>ask </a:t>
-            </a:r>
-            <a:r>
               <a:rPr lang="en-US" sz="2800" dirty="0">
                 <a:latin typeface="Helvetica" panose="020B0604020202020204" pitchFamily="34" charset="0"/>
                 <a:cs typeface="Helvetica" panose="020B0604020202020204" pitchFamily="34" charset="0"/>
               </a:rPr>
-              <a:t>arises naturally in many vehicle control tasks, </a:t>
-            </a:r>
-            <a:r>
-              <a:rPr lang="en-US" sz="2800" dirty="0" smtClean="0">
-                <a:latin typeface="Helvetica" panose="020B0604020202020204" pitchFamily="34" charset="0"/>
-                <a:cs typeface="Helvetica" panose="020B0604020202020204" pitchFamily="34" charset="0"/>
-              </a:rPr>
-              <a:t>and our approach is modeled after drone </a:t>
-            </a:r>
-            <a:r>
-              <a:rPr lang="en-US" sz="2800" dirty="0">
-                <a:latin typeface="Helvetica" panose="020B0604020202020204" pitchFamily="34" charset="0"/>
-                <a:cs typeface="Helvetica" panose="020B0604020202020204" pitchFamily="34" charset="0"/>
-              </a:rPr>
-              <a:t>navigation</a:t>
+              <a:t>This task arises naturally in many vehicle control tasks, and our approach is modeled after drone navigation</a:t>
             </a:r>
           </a:p>
           <a:p>
@@ -6660,28 +6594,7 @@
                 <a:latin typeface="Helvetica" panose="020B0604020202020204" pitchFamily="34" charset="0"/>
                 <a:cs typeface="Helvetica" panose="020B0604020202020204" pitchFamily="34" charset="0"/>
               </a:rPr>
-              <a:t>Commonly used to </a:t>
-            </a:r>
-            <a:r>
-              <a:rPr lang="en-US" sz="2800" dirty="0" smtClean="0">
-                <a:latin typeface="Helvetica" panose="020B0604020202020204" pitchFamily="34" charset="0"/>
-                <a:cs typeface="Helvetica" panose="020B0604020202020204" pitchFamily="34" charset="0"/>
-              </a:rPr>
-              <a:t>maintain a safe distance  from other </a:t>
-            </a:r>
-            <a:r>
-              <a:rPr lang="en-US" sz="2800" dirty="0">
-                <a:latin typeface="Helvetica" panose="020B0604020202020204" pitchFamily="34" charset="0"/>
-                <a:cs typeface="Helvetica" panose="020B0604020202020204" pitchFamily="34" charset="0"/>
-              </a:rPr>
-              <a:t>aerial </a:t>
-            </a:r>
-            <a:r>
-              <a:rPr lang="en-US" sz="2800" dirty="0" smtClean="0">
-                <a:latin typeface="Helvetica" panose="020B0604020202020204" pitchFamily="34" charset="0"/>
-                <a:cs typeface="Helvetica" panose="020B0604020202020204" pitchFamily="34" charset="0"/>
-              </a:rPr>
-              <a:t>vehicles</a:t>
+              <a:t>Commonly used to maintain a safe distance  from other aerial vehicles</a:t>
             </a:r>
           </a:p>
           <a:p>
@@ -6844,7 +6757,7 @@
           <p:cNvPr id="47" name="Picture 46">
             <a:extLst>
               <a:ext uri="{FF2B5EF4-FFF2-40B4-BE49-F238E27FC236}">
-                <a16:creationId xmlns:a16="http://schemas.microsoft.com/office/drawing/2014/main" xmlns="" id="{BD449CCB-3942-4D83-991F-AA97E1B81955}"/>
+                <a16:creationId xmlns:a16="http://schemas.microsoft.com/office/drawing/2014/main" id="{BD449CCB-3942-4D83-991F-AA97E1B81955}"/>
               </a:ext>
             </a:extLst>
           </p:cNvPr>
@@ -6879,7 +6792,7 @@
           <p:cNvPr id="43" name="TextBox 42">
             <a:extLst>
               <a:ext uri="{FF2B5EF4-FFF2-40B4-BE49-F238E27FC236}">
-                <a16:creationId xmlns:a16="http://schemas.microsoft.com/office/drawing/2014/main" xmlns="" id="{7F9C78A8-1537-4127-9AD4-195CB7F53866}"/>
+                <a16:creationId xmlns:a16="http://schemas.microsoft.com/office/drawing/2014/main" id="{7F9C78A8-1537-4127-9AD4-195CB7F53866}"/>
               </a:ext>
             </a:extLst>
           </p:cNvPr>
@@ -6888,8 +6801,8 @@
         </p:nvSpPr>
         <p:spPr>
           <a:xfrm>
-            <a:off x="23341639" y="13709531"/>
-            <a:ext cx="9028975" cy="954107"/>
+            <a:off x="23341640" y="13190143"/>
+            <a:ext cx="9028975" cy="5293757"/>
           </a:xfrm>
           <a:prstGeom prst="rect">
             <a:avLst/>
@@ -6902,7 +6815,11 @@
           </a:bodyPr>
           <a:lstStyle/>
           <a:p>
-            <a:pPr algn="just"/>
+            <a:pPr algn="just">
+              <a:spcAft>
+                <a:spcPts val="600"/>
+              </a:spcAft>
+            </a:pPr>
             <a:r>
               <a:rPr lang="en-US" sz="2800" dirty="0">
                 <a:latin typeface="Helvetica" charset="0"/>
@@ -6914,6 +6831,9 @@
           </a:p>
           <a:p>
             <a:pPr marL="342900" indent="-342900" algn="just">
+              <a:spcAft>
+                <a:spcPts val="600"/>
+              </a:spcAft>
               <a:buFont typeface="Arial" panose="020B0604020202020204" pitchFamily="34" charset="0"/>
               <a:buChar char="•"/>
             </a:pPr>
@@ -6923,37 +6843,93 @@
                 <a:ea typeface="Helvetica" charset="0"/>
                 <a:cs typeface="Helvetica" charset="0"/>
               </a:rPr>
-              <a:t>Lorem </a:t>
-            </a:r>
-            <a:r>
-              <a:rPr lang="en-US" sz="2800" dirty="0" err="1">
-                <a:latin typeface="Helvetica" charset="0"/>
-                <a:ea typeface="Helvetica" charset="0"/>
-                <a:cs typeface="Helvetica" charset="0"/>
-              </a:rPr>
-              <a:t>impsum</a:t>
-            </a:r>
+              <a:t>We could not train any fitted value iteration model to generate a meaningful model</a:t>
+            </a:r>
+          </a:p>
+          <a:p>
+            <a:pPr marL="342900" indent="-342900" algn="just">
+              <a:spcAft>
+                <a:spcPts val="600"/>
+              </a:spcAft>
+              <a:buFont typeface="Arial" panose="020B0604020202020204" pitchFamily="34" charset="0"/>
+              <a:buChar char="•"/>
+            </a:pPr>
             <a:r>
               <a:rPr lang="en-US" sz="2800" dirty="0">
                 <a:latin typeface="Helvetica" charset="0"/>
                 <a:ea typeface="Helvetica" charset="0"/>
                 <a:cs typeface="Helvetica" charset="0"/>
               </a:rPr>
-              <a:t> </a:t>
-            </a:r>
-            <a:r>
-              <a:rPr lang="en-US" sz="2800" dirty="0" err="1">
+              <a:t>The FPI model achieved surprising success</a:t>
+            </a:r>
+          </a:p>
+          <a:p>
+            <a:pPr marL="2013096" lvl="1" indent="-342900" algn="just">
+              <a:spcAft>
+                <a:spcPts val="600"/>
+              </a:spcAft>
+              <a:buFont typeface="Arial" panose="020B0604020202020204" pitchFamily="34" charset="0"/>
+              <a:buChar char="•"/>
+            </a:pPr>
+            <a:r>
+              <a:rPr lang="en-US" sz="2800" dirty="0">
                 <a:latin typeface="Helvetica" charset="0"/>
                 <a:ea typeface="Helvetica" charset="0"/>
                 <a:cs typeface="Helvetica" charset="0"/>
               </a:rPr>
-              <a:t>dorum</a:t>
-            </a:r>
-            <a:endParaRPr lang="en-US" sz="2800" dirty="0">
-              <a:latin typeface="Helvetica" charset="0"/>
-              <a:ea typeface="Helvetica" charset="0"/>
-              <a:cs typeface="Helvetica" charset="0"/>
-            </a:endParaRPr>
+              <a:t>General models for path planning are possible</a:t>
+            </a:r>
+          </a:p>
+          <a:p>
+            <a:pPr marL="2013096" lvl="1" indent="-342900">
+              <a:spcAft>
+                <a:spcPts val="600"/>
+              </a:spcAft>
+              <a:buFont typeface="Arial" panose="020B0604020202020204" pitchFamily="34" charset="0"/>
+              <a:buChar char="•"/>
+            </a:pPr>
+            <a:r>
+              <a:rPr lang="en-US" sz="2800" dirty="0">
+                <a:latin typeface="Helvetica" charset="0"/>
+                <a:ea typeface="Helvetica" charset="0"/>
+                <a:cs typeface="Helvetica" charset="0"/>
+              </a:rPr>
+              <a:t>Direct policy approximation can replace value approximation in some problems</a:t>
+            </a:r>
+          </a:p>
+          <a:p>
+            <a:pPr marL="342900" indent="-342900" algn="just">
+              <a:spcAft>
+                <a:spcPts val="600"/>
+              </a:spcAft>
+              <a:buFont typeface="Arial" panose="020B0604020202020204" pitchFamily="34" charset="0"/>
+              <a:buChar char="•"/>
+            </a:pPr>
+            <a:r>
+              <a:rPr lang="en-US" sz="2800" dirty="0">
+                <a:latin typeface="Helvetica" charset="0"/>
+                <a:ea typeface="Helvetica" charset="0"/>
+                <a:cs typeface="Helvetica" charset="0"/>
+              </a:rPr>
+              <a:t>The DFPI results underperformed</a:t>
+            </a:r>
+          </a:p>
+          <a:p>
+            <a:pPr marL="2013096" lvl="1" indent="-342900" algn="just">
+              <a:spcAft>
+                <a:spcPts val="600"/>
+              </a:spcAft>
+              <a:buFont typeface="Arial" panose="020B0604020202020204" pitchFamily="34" charset="0"/>
+              <a:buChar char="•"/>
+            </a:pPr>
+            <a:r>
+              <a:rPr lang="en-US" sz="2800" dirty="0">
+                <a:latin typeface="Helvetica" charset="0"/>
+                <a:ea typeface="Helvetica" charset="0"/>
+                <a:cs typeface="Helvetica" charset="0"/>
+              </a:rPr>
+              <a:t>Our neural network architecture failed to capture the feature complexity</a:t>
+            </a:r>
           </a:p>
         </p:txBody>
       </p:sp>
@@ -6962,7 +6938,7 @@
           <p:cNvPr id="5" name="Table 4">
             <a:extLst>
               <a:ext uri="{FF2B5EF4-FFF2-40B4-BE49-F238E27FC236}">
-                <a16:creationId xmlns:a16="http://schemas.microsoft.com/office/drawing/2014/main" xmlns="" id="{9FBBDEDD-B58C-4292-8E0C-3EB95D791C4F}"/>
+                <a16:creationId xmlns:a16="http://schemas.microsoft.com/office/drawing/2014/main" id="{9FBBDEDD-B58C-4292-8E0C-3EB95D791C4F}"/>
               </a:ext>
             </a:extLst>
           </p:cNvPr>
@@ -6972,7 +6948,7 @@
           <p:nvPr>
             <p:extLst>
               <p:ext uri="{D42A27DB-BD31-4B8C-83A1-F6EECF244321}">
-                <p14:modId xmlns:p14="http://schemas.microsoft.com/office/powerpoint/2010/main" val="2335535352"/>
+                <p14:modId xmlns:p14="http://schemas.microsoft.com/office/powerpoint/2010/main" val="937381135"/>
               </p:ext>
             </p:extLst>
           </p:nvPr>
@@ -6991,21 +6967,21 @@
                 <a:gridCol w="2815211">
                   <a:extLst>
                     <a:ext uri="{9D8B030D-6E8A-4147-A177-3AD203B41FA5}">
-                      <a16:colId xmlns:a16="http://schemas.microsoft.com/office/drawing/2014/main" xmlns="" val="7502155"/>
+                      <a16:colId xmlns:a16="http://schemas.microsoft.com/office/drawing/2014/main" val="7502155"/>
                     </a:ext>
                   </a:extLst>
                 </a:gridCol>
                 <a:gridCol w="2815211">
                   <a:extLst>
                     <a:ext uri="{9D8B030D-6E8A-4147-A177-3AD203B41FA5}">
-                      <a16:colId xmlns:a16="http://schemas.microsoft.com/office/drawing/2014/main" xmlns="" val="3360269338"/>
+                      <a16:colId xmlns:a16="http://schemas.microsoft.com/office/drawing/2014/main" val="3360269338"/>
                     </a:ext>
                   </a:extLst>
                 </a:gridCol>
                 <a:gridCol w="2815211">
                   <a:extLst>
                     <a:ext uri="{9D8B030D-6E8A-4147-A177-3AD203B41FA5}">
-                      <a16:colId xmlns:a16="http://schemas.microsoft.com/office/drawing/2014/main" xmlns="" val="3462760015"/>
+                      <a16:colId xmlns:a16="http://schemas.microsoft.com/office/drawing/2014/main" val="3462760015"/>
                     </a:ext>
                   </a:extLst>
                 </a:gridCol>
@@ -7052,7 +7028,7 @@
                 </a:tc>
                 <a:extLst>
                   <a:ext uri="{0D108BD9-81ED-4DB2-BD59-A6C34878D82A}">
-                    <a16:rowId xmlns:a16="http://schemas.microsoft.com/office/drawing/2014/main" xmlns="" val="3802877361"/>
+                    <a16:rowId xmlns:a16="http://schemas.microsoft.com/office/drawing/2014/main" val="3802877361"/>
                   </a:ext>
                 </a:extLst>
               </a:tr>
@@ -7090,7 +7066,7 @@
                     <a:p>
                       <a:r>
                         <a:rPr lang="en-US" sz="2800" dirty="0"/>
-                        <a:t>??</a:t>
+                        <a:t>156.4</a:t>
                       </a:r>
                     </a:p>
                   </a:txBody>
@@ -7098,7 +7074,7 @@
                 </a:tc>
                 <a:extLst>
                   <a:ext uri="{0D108BD9-81ED-4DB2-BD59-A6C34878D82A}">
-                    <a16:rowId xmlns:a16="http://schemas.microsoft.com/office/drawing/2014/main" xmlns="" val="412087516"/>
+                    <a16:rowId xmlns:a16="http://schemas.microsoft.com/office/drawing/2014/main" val="412087516"/>
                   </a:ext>
                 </a:extLst>
               </a:tr>
@@ -7123,7 +7099,7 @@
                     <a:p>
                       <a:r>
                         <a:rPr lang="en-US" sz="2800" dirty="0"/>
-                        <a:t>0.71</a:t>
+                        <a:t>0.88</a:t>
                       </a:r>
                     </a:p>
                   </a:txBody>
@@ -7136,7 +7112,7 @@
                     <a:p>
                       <a:r>
                         <a:rPr lang="en-US" sz="2800" dirty="0"/>
-                        <a:t>340.5</a:t>
+                        <a:t>221.4</a:t>
                       </a:r>
                     </a:p>
                   </a:txBody>
@@ -7144,7 +7120,7 @@
                 </a:tc>
                 <a:extLst>
                   <a:ext uri="{0D108BD9-81ED-4DB2-BD59-A6C34878D82A}">
-                    <a16:rowId xmlns:a16="http://schemas.microsoft.com/office/drawing/2014/main" xmlns="" val="1972306194"/>
+                    <a16:rowId xmlns:a16="http://schemas.microsoft.com/office/drawing/2014/main" val="1972306194"/>
                   </a:ext>
                 </a:extLst>
               </a:tr>
@@ -7167,7 +7143,10 @@
                     <a:bodyPr/>
                     <a:lstStyle/>
                     <a:p>
-                      <a:endParaRPr lang="en-US" sz="2800" dirty="0"/>
+                      <a:r>
+                        <a:rPr lang="en-US" sz="2800" dirty="0"/>
+                        <a:t>??</a:t>
+                      </a:r>
                     </a:p>
                   </a:txBody>
                   <a:tcPr marL="85820" marR="85820" marT="42910" marB="42910"/>
@@ -7177,14 +7156,17 @@
                     <a:bodyPr/>
                     <a:lstStyle/>
                     <a:p>
-                      <a:endParaRPr lang="en-US" sz="2800" dirty="0"/>
+                      <a:r>
+                        <a:rPr lang="en-US" sz="2800" dirty="0"/>
+                        <a:t>??</a:t>
+                      </a:r>
                     </a:p>
                   </a:txBody>
                   <a:tcPr marL="85820" marR="85820" marT="42910" marB="42910"/>
                 </a:tc>
                 <a:extLst>
                   <a:ext uri="{0D108BD9-81ED-4DB2-BD59-A6C34878D82A}">
-                    <a16:rowId xmlns:a16="http://schemas.microsoft.com/office/drawing/2014/main" xmlns="" val="458128511"/>
+                    <a16:rowId xmlns:a16="http://schemas.microsoft.com/office/drawing/2014/main" val="458128511"/>
                   </a:ext>
                 </a:extLst>
               </a:tr>
@@ -7197,7 +7179,7 @@
           <p:cNvPr id="46" name="Rounded Rectangle 24">
             <a:extLst>
               <a:ext uri="{FF2B5EF4-FFF2-40B4-BE49-F238E27FC236}">
-                <a16:creationId xmlns:a16="http://schemas.microsoft.com/office/drawing/2014/main" xmlns="" id="{5410958B-05C5-4126-B86A-88D07603E881}"/>
+                <a16:creationId xmlns:a16="http://schemas.microsoft.com/office/drawing/2014/main" id="{5410958B-05C5-4126-B86A-88D07603E881}"/>
               </a:ext>
             </a:extLst>
           </p:cNvPr>
@@ -7207,7 +7189,7 @@
         <p:spPr>
           <a:xfrm>
             <a:off x="23118546" y="12649917"/>
-            <a:ext cx="9444849" cy="6584379"/>
+            <a:ext cx="9444849" cy="6019083"/>
           </a:xfrm>
           <a:prstGeom prst="roundRect">
             <a:avLst>
@@ -7258,7 +7240,7 @@
           <p:cNvPr id="48" name="TextBox 113">
             <a:extLst>
               <a:ext uri="{FF2B5EF4-FFF2-40B4-BE49-F238E27FC236}">
-                <a16:creationId xmlns:a16="http://schemas.microsoft.com/office/drawing/2014/main" xmlns="" id="{D5EA85A8-438C-4A60-8F4E-04F5DAAFA7D0}"/>
+                <a16:creationId xmlns:a16="http://schemas.microsoft.com/office/drawing/2014/main" id="{D5EA85A8-438C-4A60-8F4E-04F5DAAFA7D0}"/>
               </a:ext>
             </a:extLst>
           </p:cNvPr>
@@ -7435,7 +7417,7 @@
           <p:nvPr/>
         </p:nvPicPr>
         <p:blipFill rotWithShape="1">
-          <a:blip r:embed="rId12">
+          <a:blip r:embed="rId12" cstate="print">
             <a:extLst>
               <a:ext uri="{28A0092B-C50C-407E-A947-70E740481C1C}">
                 <a14:useLocalDpi xmlns:a14="http://schemas.microsoft.com/office/drawing/2010/main" val="0"/>
@@ -7463,7 +7445,7 @@
           </p:cNvPicPr>
           <p:nvPr/>
         </p:nvPicPr>
-        <p:blipFill>
+        <p:blipFill rotWithShape="1">
           <a:blip r:embed="rId13">
             <a:extLst>
               <a:ext uri="{28A0092B-C50C-407E-A947-70E740481C1C}">
@@ -7471,20 +7453,454 @@
               </a:ext>
             </a:extLst>
           </a:blip>
+          <a:srcRect l="8010" t="8287" r="4005" b="7096"/>
+          <a:stretch/>
+        </p:blipFill>
+        <p:spPr>
+          <a:xfrm>
+            <a:off x="33570644" y="4021207"/>
+            <a:ext cx="5571119" cy="5357806"/>
+          </a:xfrm>
+          <a:prstGeom prst="rect">
+            <a:avLst/>
+          </a:prstGeom>
+        </p:spPr>
+      </p:pic>
+      <p:pic>
+        <p:nvPicPr>
+          <p:cNvPr id="13" name="Picture 12">
+            <a:extLst>
+              <a:ext uri="{FF2B5EF4-FFF2-40B4-BE49-F238E27FC236}">
+                <a16:creationId xmlns:a16="http://schemas.microsoft.com/office/drawing/2014/main" id="{13B8AE90-0DB1-4B63-92D4-DD298C0E6DB0}"/>
+              </a:ext>
+            </a:extLst>
+          </p:cNvPr>
+          <p:cNvPicPr>
+            <a:picLocks noChangeAspect="1"/>
+          </p:cNvPicPr>
+          <p:nvPr/>
+        </p:nvPicPr>
+        <p:blipFill>
+          <a:blip r:embed="rId14"/>
           <a:stretch>
             <a:fillRect/>
           </a:stretch>
         </p:blipFill>
         <p:spPr>
           <a:xfrm>
-            <a:off x="25002602" y="7488101"/>
-            <a:ext cx="6400800" cy="6400800"/>
+            <a:off x="33603302" y="9874994"/>
+            <a:ext cx="5538462" cy="5271701"/>
           </a:xfrm>
           <a:prstGeom prst="rect">
             <a:avLst/>
           </a:prstGeom>
         </p:spPr>
       </p:pic>
+      <p:pic>
+        <p:nvPicPr>
+          <p:cNvPr id="16" name="Picture 2" descr="https://lh3.googleusercontent.com/qj9h7itORLotO9Nz2Ju-dUs3G0zrUWbFmypi5ALbQPTmjgWxYBo-mtp4O85lQpZtuMQf7UJmZcgEb9HVPCF42iNtq7DjFGS_wFw0HSsKQAaHo383mJYkEA2Uve8Z__98gVgsEHZ0">
+            <a:extLst>
+              <a:ext uri="{FF2B5EF4-FFF2-40B4-BE49-F238E27FC236}">
+                <a16:creationId xmlns:a16="http://schemas.microsoft.com/office/drawing/2014/main" id="{1401D215-AEE6-43BA-AD02-355BD043BDF3}"/>
+              </a:ext>
+            </a:extLst>
+          </p:cNvPr>
+          <p:cNvPicPr>
+            <a:picLocks noChangeAspect="1" noChangeArrowheads="1"/>
+          </p:cNvPicPr>
+          <p:nvPr/>
+        </p:nvPicPr>
+        <p:blipFill>
+          <a:blip r:embed="rId15">
+            <a:extLst>
+              <a:ext uri="{28A0092B-C50C-407E-A947-70E740481C1C}">
+                <a14:useLocalDpi xmlns:a14="http://schemas.microsoft.com/office/drawing/2010/main" val="0"/>
+              </a:ext>
+            </a:extLst>
+          </a:blip>
+          <a:srcRect/>
+          <a:stretch>
+            <a:fillRect/>
+          </a:stretch>
+        </p:blipFill>
+        <p:spPr bwMode="auto">
+          <a:xfrm>
+            <a:off x="17558812" y="14789394"/>
+            <a:ext cx="4962051" cy="5364380"/>
+          </a:xfrm>
+          <a:prstGeom prst="rect">
+            <a:avLst/>
+          </a:prstGeom>
+          <a:noFill/>
+          <a:extLst>
+            <a:ext uri="{909E8E84-426E-40DD-AFC4-6F175D3DCCD1}">
+              <a14:hiddenFill xmlns:a14="http://schemas.microsoft.com/office/drawing/2010/main">
+                <a:solidFill>
+                  <a:srgbClr val="FFFFFF"/>
+                </a:solidFill>
+              </a14:hiddenFill>
+            </a:ext>
+          </a:extLst>
+        </p:spPr>
+      </p:pic>
+      <p:sp>
+        <p:nvSpPr>
+          <p:cNvPr id="42" name="TextBox 41">
+            <a:extLst>
+              <a:ext uri="{FF2B5EF4-FFF2-40B4-BE49-F238E27FC236}">
+                <a16:creationId xmlns:a16="http://schemas.microsoft.com/office/drawing/2014/main" id="{981E9FF8-7464-4626-8C9F-334767BAA16C}"/>
+              </a:ext>
+            </a:extLst>
+          </p:cNvPr>
+          <p:cNvSpPr txBox="1"/>
+          <p:nvPr/>
+        </p:nvSpPr>
+        <p:spPr>
+          <a:xfrm>
+            <a:off x="18123397" y="20315878"/>
+            <a:ext cx="4037051" cy="523220"/>
+          </a:xfrm>
+          <a:prstGeom prst="rect">
+            <a:avLst/>
+          </a:prstGeom>
+          <a:noFill/>
+        </p:spPr>
+        <p:txBody>
+          <a:bodyPr wrap="square" rtlCol="0">
+            <a:spAutoFit/>
+          </a:bodyPr>
+          <a:lstStyle/>
+          <a:p>
+            <a:pPr algn="just">
+              <a:spcAft>
+                <a:spcPts val="600"/>
+              </a:spcAft>
+            </a:pPr>
+            <a:r>
+              <a:rPr lang="en-US" sz="2800" i="1" dirty="0">
+                <a:latin typeface="Helvetica" charset="0"/>
+                <a:ea typeface="Helvetica" charset="0"/>
+                <a:cs typeface="Helvetica" charset="0"/>
+              </a:rPr>
+              <a:t>Neural Net Architecture</a:t>
+            </a:r>
+          </a:p>
+        </p:txBody>
+      </p:sp>
+      <p:sp>
+        <p:nvSpPr>
+          <p:cNvPr id="44" name="TextBox 43">
+            <a:extLst>
+              <a:ext uri="{FF2B5EF4-FFF2-40B4-BE49-F238E27FC236}">
+                <a16:creationId xmlns:a16="http://schemas.microsoft.com/office/drawing/2014/main" id="{7658E10F-DE12-457F-BAC4-B9E785FF079C}"/>
+              </a:ext>
+            </a:extLst>
+          </p:cNvPr>
+          <p:cNvSpPr txBox="1"/>
+          <p:nvPr/>
+        </p:nvSpPr>
+        <p:spPr>
+          <a:xfrm>
+            <a:off x="23392516" y="19767372"/>
+            <a:ext cx="8822800" cy="2400657"/>
+          </a:xfrm>
+          <a:prstGeom prst="rect">
+            <a:avLst/>
+          </a:prstGeom>
+          <a:noFill/>
+        </p:spPr>
+        <p:txBody>
+          <a:bodyPr wrap="square" rtlCol="0">
+            <a:spAutoFit/>
+          </a:bodyPr>
+          <a:lstStyle/>
+          <a:p>
+            <a:pPr marL="457200" indent="-457200" algn="just">
+              <a:spcAft>
+                <a:spcPts val="600"/>
+              </a:spcAft>
+              <a:buFont typeface="Arial" panose="020B0604020202020204" pitchFamily="34" charset="0"/>
+              <a:buChar char="•"/>
+            </a:pPr>
+            <a:r>
+              <a:rPr lang="en-US" sz="2800" dirty="0">
+                <a:latin typeface="Helvetica" charset="0"/>
+                <a:ea typeface="Helvetica" charset="0"/>
+                <a:cs typeface="Helvetica" charset="0"/>
+              </a:rPr>
+              <a:t>Improve NN architecture to capture problem</a:t>
+            </a:r>
+          </a:p>
+          <a:p>
+            <a:pPr marL="457200" indent="-457200">
+              <a:spcAft>
+                <a:spcPts val="600"/>
+              </a:spcAft>
+              <a:buFont typeface="Arial" panose="020B0604020202020204" pitchFamily="34" charset="0"/>
+              <a:buChar char="•"/>
+            </a:pPr>
+            <a:r>
+              <a:rPr lang="en-US" sz="2800" dirty="0">
+                <a:latin typeface="Helvetica" charset="0"/>
+                <a:ea typeface="Helvetica" charset="0"/>
+                <a:cs typeface="Helvetica" charset="0"/>
+              </a:rPr>
+              <a:t>Address more complex problems (moving obstacles, path smoothness constraints, etc.)</a:t>
+            </a:r>
+          </a:p>
+          <a:p>
+            <a:pPr marL="457200" indent="-457200">
+              <a:spcAft>
+                <a:spcPts val="600"/>
+              </a:spcAft>
+              <a:buFont typeface="Arial" panose="020B0604020202020204" pitchFamily="34" charset="0"/>
+              <a:buChar char="•"/>
+            </a:pPr>
+            <a:r>
+              <a:rPr lang="en-US" sz="2800" dirty="0">
+                <a:latin typeface="Helvetica" charset="0"/>
+                <a:ea typeface="Helvetica" charset="0"/>
+                <a:cs typeface="Helvetica" charset="0"/>
+              </a:rPr>
+              <a:t>Explore fitted policy iteration further, comparing it to fitted value iteration on known problems</a:t>
+            </a:r>
+          </a:p>
+        </p:txBody>
+      </p:sp>
+      <p:sp>
+        <p:nvSpPr>
+          <p:cNvPr id="45" name="Rounded Rectangle 24">
+            <a:extLst>
+              <a:ext uri="{FF2B5EF4-FFF2-40B4-BE49-F238E27FC236}">
+                <a16:creationId xmlns:a16="http://schemas.microsoft.com/office/drawing/2014/main" id="{9BEC0311-BF87-4E88-8DCC-07914F44CBF6}"/>
+              </a:ext>
+            </a:extLst>
+          </p:cNvPr>
+          <p:cNvSpPr/>
+          <p:nvPr/>
+        </p:nvSpPr>
+        <p:spPr>
+          <a:xfrm>
+            <a:off x="23111123" y="18868620"/>
+            <a:ext cx="9444848" cy="3679576"/>
+          </a:xfrm>
+          <a:prstGeom prst="roundRect">
+            <a:avLst>
+              <a:gd name="adj" fmla="val 3786"/>
+            </a:avLst>
+          </a:prstGeom>
+          <a:noFill/>
+          <a:ln w="57150">
+            <a:solidFill>
+              <a:srgbClr val="C00000"/>
+            </a:solidFill>
+          </a:ln>
+        </p:spPr>
+        <p:style>
+          <a:lnRef idx="2">
+            <a:schemeClr val="accent1">
+              <a:shade val="50000"/>
+            </a:schemeClr>
+          </a:lnRef>
+          <a:fillRef idx="1">
+            <a:schemeClr val="accent1"/>
+          </a:fillRef>
+          <a:effectRef idx="0">
+            <a:schemeClr val="accent1"/>
+          </a:effectRef>
+          <a:fontRef idx="minor">
+            <a:schemeClr val="lt1"/>
+          </a:fontRef>
+        </p:style>
+        <p:txBody>
+          <a:bodyPr lIns="78373" tIns="39187" rIns="78373" bIns="39187" anchor="ctr"/>
+          <a:lstStyle/>
+          <a:p>
+            <a:pPr algn="ctr" defTabSz="3134677" eaLnBrk="1" hangingPunct="1">
+              <a:defRPr/>
+            </a:pPr>
+            <a:endParaRPr kumimoji="0" lang="zh-TW" altLang="en-US" sz="5166">
+              <a:solidFill>
+                <a:srgbClr val="FFFFFF"/>
+              </a:solidFill>
+              <a:latin typeface="Helvetica" pitchFamily="34" charset="0"/>
+            </a:endParaRPr>
+          </a:p>
+        </p:txBody>
+      </p:sp>
+      <p:sp>
+        <p:nvSpPr>
+          <p:cNvPr id="49" name="TextBox 113">
+            <a:extLst>
+              <a:ext uri="{FF2B5EF4-FFF2-40B4-BE49-F238E27FC236}">
+                <a16:creationId xmlns:a16="http://schemas.microsoft.com/office/drawing/2014/main" id="{53905A34-984A-4694-A44D-9E5B1292A34D}"/>
+              </a:ext>
+            </a:extLst>
+          </p:cNvPr>
+          <p:cNvSpPr txBox="1">
+            <a:spLocks noChangeArrowheads="1"/>
+          </p:cNvSpPr>
+          <p:nvPr/>
+        </p:nvSpPr>
+        <p:spPr bwMode="auto">
+          <a:xfrm>
+            <a:off x="23334216" y="19020303"/>
+            <a:ext cx="8793178" cy="756248"/>
+          </a:xfrm>
+          <a:prstGeom prst="rect">
+            <a:avLst/>
+          </a:prstGeom>
+          <a:noFill/>
+          <a:ln>
+            <a:noFill/>
+          </a:ln>
+          <a:extLst>
+            <a:ext uri="{909E8E84-426E-40DD-AFC4-6F175D3DCCD1}">
+              <a14:hiddenFill xmlns:a14="http://schemas.microsoft.com/office/drawing/2010/main">
+                <a:solidFill>
+                  <a:srgbClr val="FFFFFF"/>
+                </a:solidFill>
+              </a14:hiddenFill>
+            </a:ext>
+            <a:ext uri="{91240B29-F687-4F45-9708-019B960494DF}">
+              <a14:hiddenLine xmlns:a14="http://schemas.microsoft.com/office/drawing/2010/main" w="9525">
+                <a:solidFill>
+                  <a:srgbClr val="000000"/>
+                </a:solidFill>
+                <a:miter lim="800000"/>
+                <a:headEnd/>
+                <a:tailEnd/>
+              </a14:hiddenLine>
+            </a:ext>
+          </a:extLst>
+        </p:spPr>
+        <p:txBody>
+          <a:bodyPr wrap="square" lIns="78373" tIns="39187" rIns="78373" bIns="39187">
+            <a:spAutoFit/>
+          </a:bodyPr>
+          <a:lstStyle>
+            <a:lvl1pPr eaLnBrk="0" hangingPunct="0">
+              <a:defRPr kumimoji="1" sz="6200">
+                <a:solidFill>
+                  <a:schemeClr val="tx1"/>
+                </a:solidFill>
+                <a:latin typeface="Arial" panose="020B0604020202020204" pitchFamily="34" charset="0"/>
+                <a:ea typeface="PMingLiU" panose="02020500000000000000" pitchFamily="18" charset="-120"/>
+              </a:defRPr>
+            </a:lvl1pPr>
+            <a:lvl2pPr marL="742950" indent="-285750" eaLnBrk="0" hangingPunct="0">
+              <a:defRPr kumimoji="1" sz="6200">
+                <a:solidFill>
+                  <a:schemeClr val="tx1"/>
+                </a:solidFill>
+                <a:latin typeface="Arial" panose="020B0604020202020204" pitchFamily="34" charset="0"/>
+                <a:ea typeface="PMingLiU" panose="02020500000000000000" pitchFamily="18" charset="-120"/>
+              </a:defRPr>
+            </a:lvl2pPr>
+            <a:lvl3pPr marL="1143000" indent="-228600" eaLnBrk="0" hangingPunct="0">
+              <a:defRPr kumimoji="1" sz="6200">
+                <a:solidFill>
+                  <a:schemeClr val="tx1"/>
+                </a:solidFill>
+                <a:latin typeface="Arial" panose="020B0604020202020204" pitchFamily="34" charset="0"/>
+                <a:ea typeface="PMingLiU" panose="02020500000000000000" pitchFamily="18" charset="-120"/>
+              </a:defRPr>
+            </a:lvl3pPr>
+            <a:lvl4pPr marL="1600200" indent="-228600" eaLnBrk="0" hangingPunct="0">
+              <a:defRPr kumimoji="1" sz="6200">
+                <a:solidFill>
+                  <a:schemeClr val="tx1"/>
+                </a:solidFill>
+                <a:latin typeface="Arial" panose="020B0604020202020204" pitchFamily="34" charset="0"/>
+                <a:ea typeface="PMingLiU" panose="02020500000000000000" pitchFamily="18" charset="-120"/>
+              </a:defRPr>
+            </a:lvl4pPr>
+            <a:lvl5pPr marL="2057400" indent="-228600" eaLnBrk="0" hangingPunct="0">
+              <a:defRPr kumimoji="1" sz="6200">
+                <a:solidFill>
+                  <a:schemeClr val="tx1"/>
+                </a:solidFill>
+                <a:latin typeface="Arial" panose="020B0604020202020204" pitchFamily="34" charset="0"/>
+                <a:ea typeface="PMingLiU" panose="02020500000000000000" pitchFamily="18" charset="-120"/>
+              </a:defRPr>
+            </a:lvl5pPr>
+            <a:lvl6pPr marL="2514600" indent="-228600" defTabSz="3133725" eaLnBrk="0" fontAlgn="base" hangingPunct="0">
+              <a:spcBef>
+                <a:spcPct val="0"/>
+              </a:spcBef>
+              <a:spcAft>
+                <a:spcPct val="0"/>
+              </a:spcAft>
+              <a:defRPr kumimoji="1" sz="6200">
+                <a:solidFill>
+                  <a:schemeClr val="tx1"/>
+                </a:solidFill>
+                <a:latin typeface="Arial" panose="020B0604020202020204" pitchFamily="34" charset="0"/>
+                <a:ea typeface="PMingLiU" panose="02020500000000000000" pitchFamily="18" charset="-120"/>
+              </a:defRPr>
+            </a:lvl6pPr>
+            <a:lvl7pPr marL="2971800" indent="-228600" defTabSz="3133725" eaLnBrk="0" fontAlgn="base" hangingPunct="0">
+              <a:spcBef>
+                <a:spcPct val="0"/>
+              </a:spcBef>
+              <a:spcAft>
+                <a:spcPct val="0"/>
+              </a:spcAft>
+              <a:defRPr kumimoji="1" sz="6200">
+                <a:solidFill>
+                  <a:schemeClr val="tx1"/>
+                </a:solidFill>
+                <a:latin typeface="Arial" panose="020B0604020202020204" pitchFamily="34" charset="0"/>
+                <a:ea typeface="PMingLiU" panose="02020500000000000000" pitchFamily="18" charset="-120"/>
+              </a:defRPr>
+            </a:lvl7pPr>
+            <a:lvl8pPr marL="3429000" indent="-228600" defTabSz="3133725" eaLnBrk="0" fontAlgn="base" hangingPunct="0">
+              <a:spcBef>
+                <a:spcPct val="0"/>
+              </a:spcBef>
+              <a:spcAft>
+                <a:spcPct val="0"/>
+              </a:spcAft>
+              <a:defRPr kumimoji="1" sz="6200">
+                <a:solidFill>
+                  <a:schemeClr val="tx1"/>
+                </a:solidFill>
+                <a:latin typeface="Arial" panose="020B0604020202020204" pitchFamily="34" charset="0"/>
+                <a:ea typeface="PMingLiU" panose="02020500000000000000" pitchFamily="18" charset="-120"/>
+              </a:defRPr>
+            </a:lvl8pPr>
+            <a:lvl9pPr marL="3886200" indent="-228600" defTabSz="3133725" eaLnBrk="0" fontAlgn="base" hangingPunct="0">
+              <a:spcBef>
+                <a:spcPct val="0"/>
+              </a:spcBef>
+              <a:spcAft>
+                <a:spcPct val="0"/>
+              </a:spcAft>
+              <a:defRPr kumimoji="1" sz="6200">
+                <a:solidFill>
+                  <a:schemeClr val="tx1"/>
+                </a:solidFill>
+                <a:latin typeface="Arial" panose="020B0604020202020204" pitchFamily="34" charset="0"/>
+                <a:ea typeface="PMingLiU" panose="02020500000000000000" pitchFamily="18" charset="-120"/>
+              </a:defRPr>
+            </a:lvl9pPr>
+          </a:lstStyle>
+          <a:p>
+            <a:pPr algn="ctr" defTabSz="3133475" eaLnBrk="1" hangingPunct="1">
+              <a:defRPr/>
+            </a:pPr>
+            <a:r>
+              <a:rPr kumimoji="0" lang="en-US" altLang="zh-TW" sz="4400" b="1" dirty="0">
+                <a:latin typeface="Helvetica" panose="020B0604020202020204" pitchFamily="34" charset="0"/>
+              </a:rPr>
+              <a:t>Future Work</a:t>
+            </a:r>
+            <a:endParaRPr kumimoji="0" lang="zh-TW" altLang="en-US" sz="4400" b="1" dirty="0">
+              <a:latin typeface="Helvetica" panose="020B0604020202020204" pitchFamily="34" charset="0"/>
+            </a:endParaRPr>
+          </a:p>
+        </p:txBody>
+      </p:sp>
     </p:spTree>
   </p:cSld>
   <p:clrMapOvr>

</xml_diff>

<commit_message>
poster, added sample solutions
</commit_message>
<xml_diff>
--- a/poster.pptx
+++ b/poster.pptx
@@ -4388,7 +4388,7 @@
         </p:nvGrpSpPr>
         <p:grpSpPr>
           <a:xfrm>
-            <a:off x="9285514" y="14144250"/>
+            <a:off x="9285514" y="13018801"/>
             <a:ext cx="8304095" cy="6978539"/>
             <a:chOff x="9285514" y="14144250"/>
             <a:chExt cx="8304095" cy="6978539"/>
@@ -4409,7 +4409,7 @@
           <p:spPr>
             <a:xfrm>
               <a:off x="9285514" y="14144250"/>
-              <a:ext cx="8304095" cy="4139595"/>
+              <a:ext cx="8304095" cy="5001369"/>
             </a:xfrm>
             <a:prstGeom prst="rect">
               <a:avLst/>
@@ -6668,7 +6668,7 @@
         </p:nvGrpSpPr>
         <p:grpSpPr>
           <a:xfrm>
-            <a:off x="16967024" y="10737010"/>
+            <a:off x="17287079" y="10737010"/>
             <a:ext cx="4281890" cy="2711912"/>
             <a:chOff x="14097000" y="11277600"/>
             <a:chExt cx="4800600" cy="3124200"/>
@@ -6801,7 +6801,7 @@
         </p:nvSpPr>
         <p:spPr>
           <a:xfrm>
-            <a:off x="23341640" y="13190143"/>
+            <a:off x="23341640" y="13091469"/>
             <a:ext cx="9028975" cy="5293757"/>
           </a:xfrm>
           <a:prstGeom prst="rect">
@@ -7458,38 +7458,8 @@
         </p:blipFill>
         <p:spPr>
           <a:xfrm>
-            <a:off x="33570644" y="4021207"/>
+            <a:off x="34108225" y="3725258"/>
             <a:ext cx="5571119" cy="5357806"/>
-          </a:xfrm>
-          <a:prstGeom prst="rect">
-            <a:avLst/>
-          </a:prstGeom>
-        </p:spPr>
-      </p:pic>
-      <p:pic>
-        <p:nvPicPr>
-          <p:cNvPr id="13" name="Picture 12">
-            <a:extLst>
-              <a:ext uri="{FF2B5EF4-FFF2-40B4-BE49-F238E27FC236}">
-                <a16:creationId xmlns:a16="http://schemas.microsoft.com/office/drawing/2014/main" id="{13B8AE90-0DB1-4B63-92D4-DD298C0E6DB0}"/>
-              </a:ext>
-            </a:extLst>
-          </p:cNvPr>
-          <p:cNvPicPr>
-            <a:picLocks noChangeAspect="1"/>
-          </p:cNvPicPr>
-          <p:nvPr/>
-        </p:nvPicPr>
-        <p:blipFill>
-          <a:blip r:embed="rId14"/>
-          <a:stretch>
-            <a:fillRect/>
-          </a:stretch>
-        </p:blipFill>
-        <p:spPr>
-          <a:xfrm>
-            <a:off x="33603302" y="9874994"/>
-            <a:ext cx="5538462" cy="5271701"/>
           </a:xfrm>
           <a:prstGeom prst="rect">
             <a:avLst/>
@@ -7511,7 +7481,7 @@
           <p:nvPr/>
         </p:nvPicPr>
         <p:blipFill>
-          <a:blip r:embed="rId15">
+          <a:blip r:embed="rId14">
             <a:extLst>
               <a:ext uri="{28A0092B-C50C-407E-A947-70E740481C1C}">
                 <a14:useLocalDpi xmlns:a14="http://schemas.microsoft.com/office/drawing/2010/main" val="0"/>
@@ -7525,7 +7495,7 @@
         </p:blipFill>
         <p:spPr bwMode="auto">
           <a:xfrm>
-            <a:off x="17558812" y="14789394"/>
+            <a:off x="17544491" y="14237198"/>
             <a:ext cx="4962051" cy="5364380"/>
           </a:xfrm>
           <a:prstGeom prst="rect">
@@ -7557,7 +7527,7 @@
         </p:nvSpPr>
         <p:spPr>
           <a:xfrm>
-            <a:off x="18123397" y="20315878"/>
+            <a:off x="18109076" y="19763682"/>
             <a:ext cx="4037051" cy="523220"/>
           </a:xfrm>
           <a:prstGeom prst="rect">
@@ -7898,6 +7868,374 @@
             <a:endParaRPr kumimoji="0" lang="zh-TW" altLang="en-US" sz="4400" b="1" dirty="0">
               <a:latin typeface="Helvetica" panose="020B0604020202020204" pitchFamily="34" charset="0"/>
             </a:endParaRPr>
+          </a:p>
+        </p:txBody>
+      </p:sp>
+      <p:pic>
+        <p:nvPicPr>
+          <p:cNvPr id="21" name="Picture 20">
+            <a:extLst>
+              <a:ext uri="{FF2B5EF4-FFF2-40B4-BE49-F238E27FC236}">
+                <a16:creationId xmlns:a16="http://schemas.microsoft.com/office/drawing/2014/main" id="{81852556-2CB5-4A80-ABA5-15933703430E}"/>
+              </a:ext>
+            </a:extLst>
+          </p:cNvPr>
+          <p:cNvPicPr>
+            <a:picLocks noChangeAspect="1"/>
+          </p:cNvPicPr>
+          <p:nvPr/>
+        </p:nvPicPr>
+        <p:blipFill>
+          <a:blip r:embed="rId15"/>
+          <a:stretch>
+            <a:fillRect/>
+          </a:stretch>
+        </p:blipFill>
+        <p:spPr>
+          <a:xfrm>
+            <a:off x="34137600" y="9874096"/>
+            <a:ext cx="5541744" cy="5273497"/>
+          </a:xfrm>
+          <a:prstGeom prst="rect">
+            <a:avLst/>
+          </a:prstGeom>
+        </p:spPr>
+      </p:pic>
+      <p:grpSp>
+        <p:nvGrpSpPr>
+          <p:cNvPr id="24" name="Group 23">
+            <a:extLst>
+              <a:ext uri="{FF2B5EF4-FFF2-40B4-BE49-F238E27FC236}">
+                <a16:creationId xmlns:a16="http://schemas.microsoft.com/office/drawing/2014/main" id="{4DDDA098-BCA2-4DC3-B9C8-E4AA4FB5CD91}"/>
+              </a:ext>
+            </a:extLst>
+          </p:cNvPr>
+          <p:cNvGrpSpPr/>
+          <p:nvPr/>
+        </p:nvGrpSpPr>
+        <p:grpSpPr>
+          <a:xfrm>
+            <a:off x="10133824" y="21494246"/>
+            <a:ext cx="3027082" cy="3535974"/>
+            <a:chOff x="10237516" y="21491815"/>
+            <a:chExt cx="3027082" cy="3535974"/>
+          </a:xfrm>
+        </p:grpSpPr>
+        <p:pic>
+          <p:nvPicPr>
+            <p:cNvPr id="50" name="Picture 49">
+              <a:extLst>
+                <a:ext uri="{FF2B5EF4-FFF2-40B4-BE49-F238E27FC236}">
+                  <a16:creationId xmlns:a16="http://schemas.microsoft.com/office/drawing/2014/main" id="{85002124-0D21-477C-B9FB-502BD091C806}"/>
+                </a:ext>
+              </a:extLst>
+            </p:cNvPr>
+            <p:cNvPicPr>
+              <a:picLocks noChangeAspect="1"/>
+            </p:cNvPicPr>
+            <p:nvPr/>
+          </p:nvPicPr>
+          <p:blipFill rotWithShape="1">
+            <a:blip r:embed="rId13">
+              <a:extLst>
+                <a:ext uri="{28A0092B-C50C-407E-A947-70E740481C1C}">
+                  <a14:useLocalDpi xmlns:a14="http://schemas.microsoft.com/office/drawing/2010/main" val="0"/>
+                </a:ext>
+              </a:extLst>
+            </a:blip>
+            <a:srcRect l="11380" t="11227" r="69490" b="70018"/>
+            <a:stretch/>
+          </p:blipFill>
+          <p:spPr>
+            <a:xfrm>
+              <a:off x="10237516" y="21491815"/>
+              <a:ext cx="3027082" cy="2967727"/>
+            </a:xfrm>
+            <a:prstGeom prst="rect">
+              <a:avLst/>
+            </a:prstGeom>
+          </p:spPr>
+        </p:pic>
+        <p:sp>
+          <p:nvSpPr>
+            <p:cNvPr id="51" name="TextBox 50">
+              <a:extLst>
+                <a:ext uri="{FF2B5EF4-FFF2-40B4-BE49-F238E27FC236}">
+                  <a16:creationId xmlns:a16="http://schemas.microsoft.com/office/drawing/2014/main" id="{4A8FF56F-E457-44D3-A689-EE2D7FBFDB26}"/>
+                </a:ext>
+              </a:extLst>
+            </p:cNvPr>
+            <p:cNvSpPr txBox="1"/>
+            <p:nvPr/>
+          </p:nvSpPr>
+          <p:spPr>
+            <a:xfrm>
+              <a:off x="10559973" y="24504569"/>
+              <a:ext cx="2218565" cy="523220"/>
+            </a:xfrm>
+            <a:prstGeom prst="rect">
+              <a:avLst/>
+            </a:prstGeom>
+            <a:noFill/>
+          </p:spPr>
+          <p:txBody>
+            <a:bodyPr wrap="square" rtlCol="0">
+              <a:spAutoFit/>
+            </a:bodyPr>
+            <a:lstStyle/>
+            <a:p>
+              <a:pPr algn="ctr">
+                <a:spcAft>
+                  <a:spcPts val="600"/>
+                </a:spcAft>
+              </a:pPr>
+              <a:r>
+                <a:rPr lang="en-US" sz="2800" i="1" dirty="0">
+                  <a:latin typeface="Helvetica" charset="0"/>
+                  <a:ea typeface="Helvetica" charset="0"/>
+                  <a:cs typeface="Helvetica" charset="0"/>
+                </a:rPr>
+                <a:t>Optimization</a:t>
+              </a:r>
+            </a:p>
+          </p:txBody>
+        </p:sp>
+      </p:grpSp>
+      <p:grpSp>
+        <p:nvGrpSpPr>
+          <p:cNvPr id="26" name="Group 25">
+            <a:extLst>
+              <a:ext uri="{FF2B5EF4-FFF2-40B4-BE49-F238E27FC236}">
+                <a16:creationId xmlns:a16="http://schemas.microsoft.com/office/drawing/2014/main" id="{29675C06-454B-4217-A8ED-E4EC1502C53C}"/>
+              </a:ext>
+            </a:extLst>
+          </p:cNvPr>
+          <p:cNvGrpSpPr/>
+          <p:nvPr/>
+        </p:nvGrpSpPr>
+        <p:grpSpPr>
+          <a:xfrm>
+            <a:off x="14116478" y="21481252"/>
+            <a:ext cx="3027082" cy="3548968"/>
+            <a:chOff x="14220170" y="21429426"/>
+            <a:chExt cx="3027082" cy="3548968"/>
+          </a:xfrm>
+        </p:grpSpPr>
+        <p:pic>
+          <p:nvPicPr>
+            <p:cNvPr id="13" name="Picture 12">
+              <a:extLst>
+                <a:ext uri="{FF2B5EF4-FFF2-40B4-BE49-F238E27FC236}">
+                  <a16:creationId xmlns:a16="http://schemas.microsoft.com/office/drawing/2014/main" id="{13B8AE90-0DB1-4B63-92D4-DD298C0E6DB0}"/>
+                </a:ext>
+              </a:extLst>
+            </p:cNvPr>
+            <p:cNvPicPr>
+              <a:picLocks noChangeAspect="1"/>
+            </p:cNvPicPr>
+            <p:nvPr/>
+          </p:nvPicPr>
+          <p:blipFill rotWithShape="1">
+            <a:blip r:embed="rId16"/>
+            <a:srcRect l="6729" t="1295" r="70992" b="75758"/>
+            <a:stretch/>
+          </p:blipFill>
+          <p:spPr>
+            <a:xfrm>
+              <a:off x="14220170" y="21429426"/>
+              <a:ext cx="3027082" cy="2967621"/>
+            </a:xfrm>
+            <a:prstGeom prst="rect">
+              <a:avLst/>
+            </a:prstGeom>
+          </p:spPr>
+        </p:pic>
+        <p:sp>
+          <p:nvSpPr>
+            <p:cNvPr id="52" name="TextBox 51">
+              <a:extLst>
+                <a:ext uri="{FF2B5EF4-FFF2-40B4-BE49-F238E27FC236}">
+                  <a16:creationId xmlns:a16="http://schemas.microsoft.com/office/drawing/2014/main" id="{418D0DDE-180D-4798-8C20-3190B2C24A69}"/>
+                </a:ext>
+              </a:extLst>
+            </p:cNvPr>
+            <p:cNvSpPr txBox="1"/>
+            <p:nvPr/>
+          </p:nvSpPr>
+          <p:spPr>
+            <a:xfrm>
+              <a:off x="15292917" y="24455174"/>
+              <a:ext cx="881587" cy="523220"/>
+            </a:xfrm>
+            <a:prstGeom prst="rect">
+              <a:avLst/>
+            </a:prstGeom>
+            <a:noFill/>
+          </p:spPr>
+          <p:txBody>
+            <a:bodyPr wrap="square" rtlCol="0">
+              <a:spAutoFit/>
+            </a:bodyPr>
+            <a:lstStyle/>
+            <a:p>
+              <a:pPr algn="ctr">
+                <a:spcAft>
+                  <a:spcPts val="600"/>
+                </a:spcAft>
+              </a:pPr>
+              <a:r>
+                <a:rPr lang="en-US" sz="2800" i="1" dirty="0">
+                  <a:latin typeface="Helvetica" charset="0"/>
+                  <a:ea typeface="Helvetica" charset="0"/>
+                  <a:cs typeface="Helvetica" charset="0"/>
+                </a:rPr>
+                <a:t>FPI</a:t>
+              </a:r>
+            </a:p>
+          </p:txBody>
+        </p:sp>
+      </p:grpSp>
+      <p:grpSp>
+        <p:nvGrpSpPr>
+          <p:cNvPr id="27" name="Group 26">
+            <a:extLst>
+              <a:ext uri="{FF2B5EF4-FFF2-40B4-BE49-F238E27FC236}">
+                <a16:creationId xmlns:a16="http://schemas.microsoft.com/office/drawing/2014/main" id="{84CF14C4-7DB5-429C-8B81-211A3962B302}"/>
+              </a:ext>
+            </a:extLst>
+          </p:cNvPr>
+          <p:cNvGrpSpPr/>
+          <p:nvPr/>
+        </p:nvGrpSpPr>
+        <p:grpSpPr>
+          <a:xfrm>
+            <a:off x="18099132" y="21428173"/>
+            <a:ext cx="2990155" cy="3665294"/>
+            <a:chOff x="18202824" y="21344565"/>
+            <a:chExt cx="2990155" cy="3665294"/>
+          </a:xfrm>
+        </p:grpSpPr>
+        <p:sp>
+          <p:nvSpPr>
+            <p:cNvPr id="53" name="TextBox 52">
+              <a:extLst>
+                <a:ext uri="{FF2B5EF4-FFF2-40B4-BE49-F238E27FC236}">
+                  <a16:creationId xmlns:a16="http://schemas.microsoft.com/office/drawing/2014/main" id="{037265A0-4954-40E0-BA8C-2977C477F16C}"/>
+                </a:ext>
+              </a:extLst>
+            </p:cNvPr>
+            <p:cNvSpPr txBox="1"/>
+            <p:nvPr/>
+          </p:nvSpPr>
+          <p:spPr>
+            <a:xfrm>
+              <a:off x="18730439" y="24486639"/>
+              <a:ext cx="2146882" cy="523220"/>
+            </a:xfrm>
+            <a:prstGeom prst="rect">
+              <a:avLst/>
+            </a:prstGeom>
+            <a:noFill/>
+          </p:spPr>
+          <p:txBody>
+            <a:bodyPr wrap="square" rtlCol="0">
+              <a:spAutoFit/>
+            </a:bodyPr>
+            <a:lstStyle/>
+            <a:p>
+              <a:pPr algn="ctr">
+                <a:spcAft>
+                  <a:spcPts val="600"/>
+                </a:spcAft>
+              </a:pPr>
+              <a:r>
+                <a:rPr lang="en-US" sz="2800" i="1" dirty="0">
+                  <a:latin typeface="Helvetica" charset="0"/>
+                  <a:ea typeface="Helvetica" charset="0"/>
+                  <a:cs typeface="Helvetica" charset="0"/>
+                </a:rPr>
+                <a:t>Deep FPI</a:t>
+              </a:r>
+            </a:p>
+          </p:txBody>
+        </p:sp>
+        <p:pic>
+          <p:nvPicPr>
+            <p:cNvPr id="23" name="Picture 22">
+              <a:extLst>
+                <a:ext uri="{FF2B5EF4-FFF2-40B4-BE49-F238E27FC236}">
+                  <a16:creationId xmlns:a16="http://schemas.microsoft.com/office/drawing/2014/main" id="{AEF02A23-F689-47A8-A0C5-013DB156B032}"/>
+                </a:ext>
+              </a:extLst>
+            </p:cNvPr>
+            <p:cNvPicPr>
+              <a:picLocks noChangeAspect="1"/>
+            </p:cNvPicPr>
+            <p:nvPr/>
+          </p:nvPicPr>
+          <p:blipFill rotWithShape="1">
+            <a:blip r:embed="rId17">
+              <a:extLst>
+                <a:ext uri="{28A0092B-C50C-407E-A947-70E740481C1C}">
+                  <a14:useLocalDpi xmlns:a14="http://schemas.microsoft.com/office/drawing/2010/main" val="0"/>
+                </a:ext>
+              </a:extLst>
+            </a:blip>
+            <a:srcRect l="6682" t="375" r="71353" b="76067"/>
+            <a:stretch/>
+          </p:blipFill>
+          <p:spPr>
+            <a:xfrm>
+              <a:off x="18202824" y="21344565"/>
+              <a:ext cx="2990155" cy="3052482"/>
+            </a:xfrm>
+            <a:prstGeom prst="rect">
+              <a:avLst/>
+            </a:prstGeom>
+          </p:spPr>
+        </p:pic>
+      </p:grpSp>
+      <p:sp>
+        <p:nvSpPr>
+          <p:cNvPr id="58" name="TextBox 57">
+            <a:extLst>
+              <a:ext uri="{FF2B5EF4-FFF2-40B4-BE49-F238E27FC236}">
+                <a16:creationId xmlns:a16="http://schemas.microsoft.com/office/drawing/2014/main" id="{E65F6DB4-6947-4E6D-98E4-3950E9013BA5}"/>
+              </a:ext>
+            </a:extLst>
+          </p:cNvPr>
+          <p:cNvSpPr txBox="1"/>
+          <p:nvPr/>
+        </p:nvSpPr>
+        <p:spPr>
+          <a:xfrm>
+            <a:off x="11567112" y="20924419"/>
+            <a:ext cx="7966430" cy="523220"/>
+          </a:xfrm>
+          <a:prstGeom prst="rect">
+            <a:avLst/>
+          </a:prstGeom>
+          <a:noFill/>
+        </p:spPr>
+        <p:txBody>
+          <a:bodyPr wrap="square" rtlCol="0">
+            <a:spAutoFit/>
+          </a:bodyPr>
+          <a:lstStyle/>
+          <a:p>
+            <a:pPr algn="ctr">
+              <a:spcAft>
+                <a:spcPts val="600"/>
+              </a:spcAft>
+            </a:pPr>
+            <a:r>
+              <a:rPr lang="en-US" sz="2800" i="1" dirty="0">
+                <a:latin typeface="Helvetica" charset="0"/>
+                <a:ea typeface="Helvetica" charset="0"/>
+                <a:cs typeface="Helvetica" charset="0"/>
+              </a:rPr>
+              <a:t>Paths generated on one test map (DFPI fails)</a:t>
+            </a:r>
           </a:p>
         </p:txBody>
       </p:sp>

</xml_diff>